<commit_message>
Adding final slide decks before recording
Signed-off-by: Will Velida <willvelida@hotmail.co.uk>
</commit_message>
<xml_diff>
--- a/slide-decks/agentic-workflows-in-dapr-agents.pptx
+++ b/slide-decks/agentic-workflows-in-dapr-agents.pptx
@@ -4,14 +4,16 @@
   <p:sldMasterIdLst>
     <p:sldMasterId id="2147483660" r:id="rId1"/>
   </p:sldMasterIdLst>
+  <p:notesMasterIdLst>
+    <p:notesMasterId r:id="rId8"/>
+  </p:notesMasterIdLst>
   <p:sldIdLst>
-    <p:sldId id="264" r:id="rId2"/>
-    <p:sldId id="263" r:id="rId3"/>
-    <p:sldId id="269" r:id="rId4"/>
-    <p:sldId id="267" r:id="rId5"/>
-    <p:sldId id="270" r:id="rId6"/>
-    <p:sldId id="271" r:id="rId7"/>
-    <p:sldId id="266" r:id="rId8"/>
+    <p:sldId id="263" r:id="rId2"/>
+    <p:sldId id="269" r:id="rId3"/>
+    <p:sldId id="267" r:id="rId4"/>
+    <p:sldId id="270" r:id="rId5"/>
+    <p:sldId id="271" r:id="rId6"/>
+    <p:sldId id="266" r:id="rId7"/>
   </p:sldIdLst>
   <p:sldSz cx="12192000" cy="6858000"/>
   <p:notesSz cx="6858000" cy="9144000"/>
@@ -110,6 +112,11 @@
       </a:defRPr>
     </a:lvl9pPr>
   </p:defaultTextStyle>
+  <p:extLst>
+    <p:ext uri="{EFAFB233-063F-42B5-8137-9DF3F51BA10A}">
+      <p15:sldGuideLst xmlns:p15="http://schemas.microsoft.com/office/powerpoint/2012/main"/>
+    </p:ext>
+  </p:extLst>
 </p:presentation>
 </file>
 
@@ -2466,7 +2473,7 @@
   <dgm:whole/>
   <dgm:extLst>
     <a:ext uri="http://schemas.microsoft.com/office/drawing/2008/diagram">
-      <dsp:dataModelExt xmlns:dsp="http://schemas.microsoft.com/office/drawing/2008/diagram" relId="rId6" minVer="http://schemas.openxmlformats.org/drawingml/2006/diagram"/>
+      <dsp:dataModelExt xmlns:dsp="http://schemas.microsoft.com/office/drawing/2008/diagram" relId="rId7" minVer="http://schemas.openxmlformats.org/drawingml/2006/diagram"/>
     </a:ext>
     <a:ext uri="{C62137D5-CB1D-491B-B009-E17868A290BF}">
       <dgm14:recolorImg xmlns:dgm14="http://schemas.microsoft.com/office/drawing/2010/diagram" val="1"/>
@@ -3342,7 +3349,7 @@
   <dgm:whole/>
   <dgm:extLst>
     <a:ext uri="http://schemas.microsoft.com/office/drawing/2008/diagram">
-      <dsp:dataModelExt xmlns:dsp="http://schemas.microsoft.com/office/drawing/2008/diagram" relId="rId6" minVer="http://schemas.openxmlformats.org/drawingml/2006/diagram"/>
+      <dsp:dataModelExt xmlns:dsp="http://schemas.microsoft.com/office/drawing/2008/diagram" relId="rId7" minVer="http://schemas.openxmlformats.org/drawingml/2006/diagram"/>
     </a:ext>
   </dgm:extLst>
 </dgm:dataModel>
@@ -9264,6 +9271,1729 @@
 </dgm:styleDef>
 </file>
 
+<file path=ppt/notesMasters/notesMaster1.xml><?xml version="1.0" encoding="utf-8"?>
+<p:notesMaster xmlns:a="http://schemas.openxmlformats.org/drawingml/2006/main" xmlns:r="http://schemas.openxmlformats.org/officeDocument/2006/relationships" xmlns:p="http://schemas.openxmlformats.org/presentationml/2006/main">
+  <p:cSld>
+    <p:bg>
+      <p:bgRef idx="1001">
+        <a:schemeClr val="bg1"/>
+      </p:bgRef>
+    </p:bg>
+    <p:spTree>
+      <p:nvGrpSpPr>
+        <p:cNvPr id="1" name=""/>
+        <p:cNvGrpSpPr/>
+        <p:nvPr/>
+      </p:nvGrpSpPr>
+      <p:grpSpPr>
+        <a:xfrm>
+          <a:off x="0" y="0"/>
+          <a:ext cx="0" cy="0"/>
+          <a:chOff x="0" y="0"/>
+          <a:chExt cx="0" cy="0"/>
+        </a:xfrm>
+      </p:grpSpPr>
+      <p:sp>
+        <p:nvSpPr>
+          <p:cNvPr id="2" name="Header Placeholder 1"/>
+          <p:cNvSpPr>
+            <a:spLocks noGrp="1"/>
+          </p:cNvSpPr>
+          <p:nvPr>
+            <p:ph type="hdr" sz="quarter"/>
+          </p:nvPr>
+        </p:nvSpPr>
+        <p:spPr>
+          <a:xfrm>
+            <a:off x="0" y="0"/>
+            <a:ext cx="2971800" cy="458788"/>
+          </a:xfrm>
+          <a:prstGeom prst="rect">
+            <a:avLst/>
+          </a:prstGeom>
+        </p:spPr>
+        <p:txBody>
+          <a:bodyPr vert="horz" lIns="91440" tIns="45720" rIns="91440" bIns="45720" rtlCol="0"/>
+          <a:lstStyle>
+            <a:lvl1pPr algn="l">
+              <a:defRPr sz="1200"/>
+            </a:lvl1pPr>
+          </a:lstStyle>
+          <a:p>
+            <a:endParaRPr lang="en-AU"/>
+          </a:p>
+        </p:txBody>
+      </p:sp>
+      <p:sp>
+        <p:nvSpPr>
+          <p:cNvPr id="3" name="Date Placeholder 2"/>
+          <p:cNvSpPr>
+            <a:spLocks noGrp="1"/>
+          </p:cNvSpPr>
+          <p:nvPr>
+            <p:ph type="dt" idx="1"/>
+          </p:nvPr>
+        </p:nvSpPr>
+        <p:spPr>
+          <a:xfrm>
+            <a:off x="3884613" y="0"/>
+            <a:ext cx="2971800" cy="458788"/>
+          </a:xfrm>
+          <a:prstGeom prst="rect">
+            <a:avLst/>
+          </a:prstGeom>
+        </p:spPr>
+        <p:txBody>
+          <a:bodyPr vert="horz" lIns="91440" tIns="45720" rIns="91440" bIns="45720" rtlCol="0"/>
+          <a:lstStyle>
+            <a:lvl1pPr algn="r">
+              <a:defRPr sz="1200"/>
+            </a:lvl1pPr>
+          </a:lstStyle>
+          <a:p>
+            <a:fld id="{433E738F-6C4C-4E1E-B0AA-0F906C7945AA}" type="datetimeFigureOut">
+              <a:rPr lang="en-AU" smtClean="0"/>
+              <a:t>1/09/2025</a:t>
+            </a:fld>
+            <a:endParaRPr lang="en-AU"/>
+          </a:p>
+        </p:txBody>
+      </p:sp>
+      <p:sp>
+        <p:nvSpPr>
+          <p:cNvPr id="4" name="Slide Image Placeholder 3"/>
+          <p:cNvSpPr>
+            <a:spLocks noGrp="1" noRot="1" noChangeAspect="1"/>
+          </p:cNvSpPr>
+          <p:nvPr>
+            <p:ph type="sldImg" idx="2"/>
+          </p:nvPr>
+        </p:nvSpPr>
+        <p:spPr>
+          <a:xfrm>
+            <a:off x="685800" y="1143000"/>
+            <a:ext cx="5486400" cy="3086100"/>
+          </a:xfrm>
+          <a:prstGeom prst="rect">
+            <a:avLst/>
+          </a:prstGeom>
+          <a:noFill/>
+          <a:ln w="12700">
+            <a:solidFill>
+              <a:prstClr val="black"/>
+            </a:solidFill>
+          </a:ln>
+        </p:spPr>
+        <p:txBody>
+          <a:bodyPr vert="horz" lIns="91440" tIns="45720" rIns="91440" bIns="45720" rtlCol="0" anchor="ctr"/>
+          <a:lstStyle/>
+          <a:p>
+            <a:endParaRPr lang="en-AU"/>
+          </a:p>
+        </p:txBody>
+      </p:sp>
+      <p:sp>
+        <p:nvSpPr>
+          <p:cNvPr id="5" name="Notes Placeholder 4"/>
+          <p:cNvSpPr>
+            <a:spLocks noGrp="1"/>
+          </p:cNvSpPr>
+          <p:nvPr>
+            <p:ph type="body" sz="quarter" idx="3"/>
+          </p:nvPr>
+        </p:nvSpPr>
+        <p:spPr>
+          <a:xfrm>
+            <a:off x="685800" y="4400550"/>
+            <a:ext cx="5486400" cy="3600450"/>
+          </a:xfrm>
+          <a:prstGeom prst="rect">
+            <a:avLst/>
+          </a:prstGeom>
+        </p:spPr>
+        <p:txBody>
+          <a:bodyPr vert="horz" lIns="91440" tIns="45720" rIns="91440" bIns="45720" rtlCol="0"/>
+          <a:lstStyle/>
+          <a:p>
+            <a:pPr lvl="0"/>
+            <a:r>
+              <a:rPr lang="en-US"/>
+              <a:t>Click to edit Master text styles</a:t>
+            </a:r>
+          </a:p>
+          <a:p>
+            <a:pPr lvl="1"/>
+            <a:r>
+              <a:rPr lang="en-US"/>
+              <a:t>Second level</a:t>
+            </a:r>
+          </a:p>
+          <a:p>
+            <a:pPr lvl="2"/>
+            <a:r>
+              <a:rPr lang="en-US"/>
+              <a:t>Third level</a:t>
+            </a:r>
+          </a:p>
+          <a:p>
+            <a:pPr lvl="3"/>
+            <a:r>
+              <a:rPr lang="en-US"/>
+              <a:t>Fourth level</a:t>
+            </a:r>
+          </a:p>
+          <a:p>
+            <a:pPr lvl="4"/>
+            <a:r>
+              <a:rPr lang="en-US"/>
+              <a:t>Fifth level</a:t>
+            </a:r>
+            <a:endParaRPr lang="en-AU"/>
+          </a:p>
+        </p:txBody>
+      </p:sp>
+      <p:sp>
+        <p:nvSpPr>
+          <p:cNvPr id="6" name="Footer Placeholder 5"/>
+          <p:cNvSpPr>
+            <a:spLocks noGrp="1"/>
+          </p:cNvSpPr>
+          <p:nvPr>
+            <p:ph type="ftr" sz="quarter" idx="4"/>
+          </p:nvPr>
+        </p:nvSpPr>
+        <p:spPr>
+          <a:xfrm>
+            <a:off x="0" y="8685213"/>
+            <a:ext cx="2971800" cy="458787"/>
+          </a:xfrm>
+          <a:prstGeom prst="rect">
+            <a:avLst/>
+          </a:prstGeom>
+        </p:spPr>
+        <p:txBody>
+          <a:bodyPr vert="horz" lIns="91440" tIns="45720" rIns="91440" bIns="45720" rtlCol="0" anchor="b"/>
+          <a:lstStyle>
+            <a:lvl1pPr algn="l">
+              <a:defRPr sz="1200"/>
+            </a:lvl1pPr>
+          </a:lstStyle>
+          <a:p>
+            <a:endParaRPr lang="en-AU"/>
+          </a:p>
+        </p:txBody>
+      </p:sp>
+      <p:sp>
+        <p:nvSpPr>
+          <p:cNvPr id="7" name="Slide Number Placeholder 6"/>
+          <p:cNvSpPr>
+            <a:spLocks noGrp="1"/>
+          </p:cNvSpPr>
+          <p:nvPr>
+            <p:ph type="sldNum" sz="quarter" idx="5"/>
+          </p:nvPr>
+        </p:nvSpPr>
+        <p:spPr>
+          <a:xfrm>
+            <a:off x="3884613" y="8685213"/>
+            <a:ext cx="2971800" cy="458787"/>
+          </a:xfrm>
+          <a:prstGeom prst="rect">
+            <a:avLst/>
+          </a:prstGeom>
+        </p:spPr>
+        <p:txBody>
+          <a:bodyPr vert="horz" lIns="91440" tIns="45720" rIns="91440" bIns="45720" rtlCol="0" anchor="b"/>
+          <a:lstStyle>
+            <a:lvl1pPr algn="r">
+              <a:defRPr sz="1200"/>
+            </a:lvl1pPr>
+          </a:lstStyle>
+          <a:p>
+            <a:fld id="{6197A77B-07D2-476D-AC96-9D1BD570262A}" type="slidenum">
+              <a:rPr lang="en-AU" smtClean="0"/>
+              <a:t>‹#›</a:t>
+            </a:fld>
+            <a:endParaRPr lang="en-AU"/>
+          </a:p>
+        </p:txBody>
+      </p:sp>
+    </p:spTree>
+    <p:extLst>
+      <p:ext uri="{BB962C8B-B14F-4D97-AF65-F5344CB8AC3E}">
+        <p14:creationId xmlns:p14="http://schemas.microsoft.com/office/powerpoint/2010/main" val="4270077895"/>
+      </p:ext>
+    </p:extLst>
+  </p:cSld>
+  <p:clrMap bg1="lt1" tx1="dk1" bg2="lt2" tx2="dk2" accent1="accent1" accent2="accent2" accent3="accent3" accent4="accent4" accent5="accent5" accent6="accent6" hlink="hlink" folHlink="folHlink"/>
+  <p:notesStyle>
+    <a:lvl1pPr marL="0" algn="l" defTabSz="914400" rtl="0" eaLnBrk="1" latinLnBrk="0" hangingPunct="1">
+      <a:defRPr sz="1200" kern="1200">
+        <a:solidFill>
+          <a:schemeClr val="tx1"/>
+        </a:solidFill>
+        <a:latin typeface="+mn-lt"/>
+        <a:ea typeface="+mn-ea"/>
+        <a:cs typeface="+mn-cs"/>
+      </a:defRPr>
+    </a:lvl1pPr>
+    <a:lvl2pPr marL="457200" algn="l" defTabSz="914400" rtl="0" eaLnBrk="1" latinLnBrk="0" hangingPunct="1">
+      <a:defRPr sz="1200" kern="1200">
+        <a:solidFill>
+          <a:schemeClr val="tx1"/>
+        </a:solidFill>
+        <a:latin typeface="+mn-lt"/>
+        <a:ea typeface="+mn-ea"/>
+        <a:cs typeface="+mn-cs"/>
+      </a:defRPr>
+    </a:lvl2pPr>
+    <a:lvl3pPr marL="914400" algn="l" defTabSz="914400" rtl="0" eaLnBrk="1" latinLnBrk="0" hangingPunct="1">
+      <a:defRPr sz="1200" kern="1200">
+        <a:solidFill>
+          <a:schemeClr val="tx1"/>
+        </a:solidFill>
+        <a:latin typeface="+mn-lt"/>
+        <a:ea typeface="+mn-ea"/>
+        <a:cs typeface="+mn-cs"/>
+      </a:defRPr>
+    </a:lvl3pPr>
+    <a:lvl4pPr marL="1371600" algn="l" defTabSz="914400" rtl="0" eaLnBrk="1" latinLnBrk="0" hangingPunct="1">
+      <a:defRPr sz="1200" kern="1200">
+        <a:solidFill>
+          <a:schemeClr val="tx1"/>
+        </a:solidFill>
+        <a:latin typeface="+mn-lt"/>
+        <a:ea typeface="+mn-ea"/>
+        <a:cs typeface="+mn-cs"/>
+      </a:defRPr>
+    </a:lvl4pPr>
+    <a:lvl5pPr marL="1828800" algn="l" defTabSz="914400" rtl="0" eaLnBrk="1" latinLnBrk="0" hangingPunct="1">
+      <a:defRPr sz="1200" kern="1200">
+        <a:solidFill>
+          <a:schemeClr val="tx1"/>
+        </a:solidFill>
+        <a:latin typeface="+mn-lt"/>
+        <a:ea typeface="+mn-ea"/>
+        <a:cs typeface="+mn-cs"/>
+      </a:defRPr>
+    </a:lvl5pPr>
+    <a:lvl6pPr marL="2286000" algn="l" defTabSz="914400" rtl="0" eaLnBrk="1" latinLnBrk="0" hangingPunct="1">
+      <a:defRPr sz="1200" kern="1200">
+        <a:solidFill>
+          <a:schemeClr val="tx1"/>
+        </a:solidFill>
+        <a:latin typeface="+mn-lt"/>
+        <a:ea typeface="+mn-ea"/>
+        <a:cs typeface="+mn-cs"/>
+      </a:defRPr>
+    </a:lvl6pPr>
+    <a:lvl7pPr marL="2743200" algn="l" defTabSz="914400" rtl="0" eaLnBrk="1" latinLnBrk="0" hangingPunct="1">
+      <a:defRPr sz="1200" kern="1200">
+        <a:solidFill>
+          <a:schemeClr val="tx1"/>
+        </a:solidFill>
+        <a:latin typeface="+mn-lt"/>
+        <a:ea typeface="+mn-ea"/>
+        <a:cs typeface="+mn-cs"/>
+      </a:defRPr>
+    </a:lvl7pPr>
+    <a:lvl8pPr marL="3200400" algn="l" defTabSz="914400" rtl="0" eaLnBrk="1" latinLnBrk="0" hangingPunct="1">
+      <a:defRPr sz="1200" kern="1200">
+        <a:solidFill>
+          <a:schemeClr val="tx1"/>
+        </a:solidFill>
+        <a:latin typeface="+mn-lt"/>
+        <a:ea typeface="+mn-ea"/>
+        <a:cs typeface="+mn-cs"/>
+      </a:defRPr>
+    </a:lvl8pPr>
+    <a:lvl9pPr marL="3657600" algn="l" defTabSz="914400" rtl="0" eaLnBrk="1" latinLnBrk="0" hangingPunct="1">
+      <a:defRPr sz="1200" kern="1200">
+        <a:solidFill>
+          <a:schemeClr val="tx1"/>
+        </a:solidFill>
+        <a:latin typeface="+mn-lt"/>
+        <a:ea typeface="+mn-ea"/>
+        <a:cs typeface="+mn-cs"/>
+      </a:defRPr>
+    </a:lvl9pPr>
+  </p:notesStyle>
+</p:notesMaster>
+</file>
+
+<file path=ppt/notesSlides/notesSlide1.xml><?xml version="1.0" encoding="utf-8"?>
+<p:notes xmlns:a="http://schemas.openxmlformats.org/drawingml/2006/main" xmlns:r="http://schemas.openxmlformats.org/officeDocument/2006/relationships" xmlns:p="http://schemas.openxmlformats.org/presentationml/2006/main">
+  <p:cSld>
+    <p:spTree>
+      <p:nvGrpSpPr>
+        <p:cNvPr id="1" name=""/>
+        <p:cNvGrpSpPr/>
+        <p:nvPr/>
+      </p:nvGrpSpPr>
+      <p:grpSpPr>
+        <a:xfrm>
+          <a:off x="0" y="0"/>
+          <a:ext cx="0" cy="0"/>
+          <a:chOff x="0" y="0"/>
+          <a:chExt cx="0" cy="0"/>
+        </a:xfrm>
+      </p:grpSpPr>
+      <p:sp>
+        <p:nvSpPr>
+          <p:cNvPr id="2" name="Slide Image Placeholder 1"/>
+          <p:cNvSpPr>
+            <a:spLocks noGrp="1" noRot="1" noChangeAspect="1"/>
+          </p:cNvSpPr>
+          <p:nvPr>
+            <p:ph type="sldImg"/>
+          </p:nvPr>
+        </p:nvSpPr>
+        <p:spPr/>
+      </p:sp>
+      <p:sp>
+        <p:nvSpPr>
+          <p:cNvPr id="3" name="Notes Placeholder 2"/>
+          <p:cNvSpPr>
+            <a:spLocks noGrp="1"/>
+          </p:cNvSpPr>
+          <p:nvPr>
+            <p:ph type="body" idx="1"/>
+          </p:nvPr>
+        </p:nvSpPr>
+        <p:spPr/>
+        <p:txBody>
+          <a:bodyPr/>
+          <a:lstStyle/>
+          <a:p>
+            <a:r>
+              <a:rPr lang="en-AU" dirty="0"/>
+              <a:t>Hey everyone! Welcome back to this series on building AI Agents with </a:t>
+            </a:r>
+            <a:r>
+              <a:rPr lang="en-AU" dirty="0" err="1"/>
+              <a:t>Dapr</a:t>
+            </a:r>
+            <a:r>
+              <a:rPr lang="en-AU" dirty="0"/>
+              <a:t> Agents! In our previous video we took at look at how we can call external tools in our </a:t>
+            </a:r>
+            <a:r>
+              <a:rPr lang="en-AU" dirty="0" err="1"/>
+              <a:t>Dapr</a:t>
+            </a:r>
+            <a:r>
+              <a:rPr lang="en-AU" dirty="0"/>
+              <a:t> Agents to enhance the capability of our agents by handling dynamic and multi-step tasks more effectively.</a:t>
+            </a:r>
+          </a:p>
+          <a:p>
+            <a:endParaRPr lang="en-AU" dirty="0"/>
+          </a:p>
+          <a:p>
+            <a:r>
+              <a:rPr lang="en-AU" dirty="0"/>
+              <a:t>Now in this video, we’re going to cover agentic workflows in </a:t>
+            </a:r>
+            <a:r>
+              <a:rPr lang="en-AU" dirty="0" err="1"/>
+              <a:t>Dapr</a:t>
+            </a:r>
+            <a:r>
+              <a:rPr lang="en-AU" dirty="0"/>
+              <a:t> Agents, and how we can use workflows to support both deterministic and event-driven task orchestration</a:t>
+            </a:r>
+          </a:p>
+        </p:txBody>
+      </p:sp>
+      <p:sp>
+        <p:nvSpPr>
+          <p:cNvPr id="4" name="Slide Number Placeholder 3"/>
+          <p:cNvSpPr>
+            <a:spLocks noGrp="1"/>
+          </p:cNvSpPr>
+          <p:nvPr>
+            <p:ph type="sldNum" sz="quarter" idx="5"/>
+          </p:nvPr>
+        </p:nvSpPr>
+        <p:spPr/>
+        <p:txBody>
+          <a:bodyPr/>
+          <a:lstStyle/>
+          <a:p>
+            <a:fld id="{6197A77B-07D2-476D-AC96-9D1BD570262A}" type="slidenum">
+              <a:rPr lang="en-AU" smtClean="0"/>
+              <a:t>1</a:t>
+            </a:fld>
+            <a:endParaRPr lang="en-AU"/>
+          </a:p>
+        </p:txBody>
+      </p:sp>
+    </p:spTree>
+    <p:extLst>
+      <p:ext uri="{BB962C8B-B14F-4D97-AF65-F5344CB8AC3E}">
+        <p14:creationId xmlns:p14="http://schemas.microsoft.com/office/powerpoint/2010/main" val="1299512617"/>
+      </p:ext>
+    </p:extLst>
+  </p:cSld>
+  <p:clrMapOvr>
+    <a:masterClrMapping/>
+  </p:clrMapOvr>
+</p:notes>
+</file>
+
+<file path=ppt/notesSlides/notesSlide2.xml><?xml version="1.0" encoding="utf-8"?>
+<p:notes xmlns:a="http://schemas.openxmlformats.org/drawingml/2006/main" xmlns:r="http://schemas.openxmlformats.org/officeDocument/2006/relationships" xmlns:p="http://schemas.openxmlformats.org/presentationml/2006/main">
+  <p:cSld>
+    <p:spTree>
+      <p:nvGrpSpPr>
+        <p:cNvPr id="1" name=""/>
+        <p:cNvGrpSpPr/>
+        <p:nvPr/>
+      </p:nvGrpSpPr>
+      <p:grpSpPr>
+        <a:xfrm>
+          <a:off x="0" y="0"/>
+          <a:ext cx="0" cy="0"/>
+          <a:chOff x="0" y="0"/>
+          <a:chExt cx="0" cy="0"/>
+        </a:xfrm>
+      </p:grpSpPr>
+      <p:sp>
+        <p:nvSpPr>
+          <p:cNvPr id="2" name="Slide Image Placeholder 1"/>
+          <p:cNvSpPr>
+            <a:spLocks noGrp="1" noRot="1" noChangeAspect="1"/>
+          </p:cNvSpPr>
+          <p:nvPr>
+            <p:ph type="sldImg"/>
+          </p:nvPr>
+        </p:nvSpPr>
+        <p:spPr/>
+      </p:sp>
+      <p:sp>
+        <p:nvSpPr>
+          <p:cNvPr id="3" name="Notes Placeholder 2"/>
+          <p:cNvSpPr>
+            <a:spLocks noGrp="1"/>
+          </p:cNvSpPr>
+          <p:nvPr>
+            <p:ph type="body" idx="1"/>
+          </p:nvPr>
+        </p:nvSpPr>
+        <p:spPr/>
+        <p:txBody>
+          <a:bodyPr/>
+          <a:lstStyle/>
+          <a:p>
+            <a:r>
+              <a:rPr lang="en-US" dirty="0"/>
+              <a:t>“If you </a:t>
+            </a:r>
+            <a:r>
+              <a:rPr lang="en-US" dirty="0" err="1"/>
+              <a:t>watnt</a:t>
+            </a:r>
+            <a:r>
+              <a:rPr lang="en-US" dirty="0"/>
+              <a:t> to automate business processes that </a:t>
+            </a:r>
+            <a:r>
+              <a:rPr lang="en-US" i="1" dirty="0"/>
+              <a:t>don’t break</a:t>
+            </a:r>
+            <a:r>
+              <a:rPr lang="en-US" dirty="0"/>
+              <a:t> when things go wrong? That’s where </a:t>
+            </a:r>
+            <a:r>
+              <a:rPr lang="en-US" b="1" dirty="0"/>
+              <a:t>durable workflows</a:t>
+            </a:r>
+            <a:r>
+              <a:rPr lang="en-US" dirty="0"/>
+              <a:t> come in.</a:t>
+            </a:r>
+          </a:p>
+          <a:p>
+            <a:endParaRPr lang="en-US" dirty="0"/>
+          </a:p>
+          <a:p>
+            <a:r>
+              <a:rPr lang="en-US" dirty="0"/>
+              <a:t>They’re built on three key parts:</a:t>
+            </a:r>
+          </a:p>
+          <a:p>
+            <a:r>
+              <a:rPr lang="en-US" dirty="0"/>
+              <a:t>🛠️ </a:t>
+            </a:r>
+            <a:r>
+              <a:rPr lang="en-US" b="1" dirty="0"/>
+              <a:t>Authoring Environment</a:t>
+            </a:r>
+            <a:r>
+              <a:rPr lang="en-US" dirty="0"/>
+              <a:t> – where you design the workflow logic</a:t>
+            </a:r>
+          </a:p>
+          <a:p>
+            <a:r>
+              <a:rPr lang="en-US" dirty="0"/>
+              <a:t>🚀 </a:t>
+            </a:r>
+            <a:r>
+              <a:rPr lang="en-US" b="1" dirty="0"/>
+              <a:t>Workflow Engine</a:t>
+            </a:r>
+            <a:r>
+              <a:rPr lang="en-US" dirty="0"/>
+              <a:t> – runs the steps, handles retries, and orchestrates execution</a:t>
+            </a:r>
+          </a:p>
+          <a:p>
+            <a:r>
+              <a:rPr lang="en-US" dirty="0"/>
+              <a:t>🗃️ </a:t>
+            </a:r>
+            <a:r>
+              <a:rPr lang="en-US" b="1" dirty="0"/>
+              <a:t>State Store</a:t>
+            </a:r>
+            <a:r>
+              <a:rPr lang="en-US" dirty="0"/>
+              <a:t> – saves progress so your workflow can pause, resume, or recover from failure</a:t>
+            </a:r>
+          </a:p>
+          <a:p>
+            <a:endParaRPr lang="en-US" dirty="0"/>
+          </a:p>
+          <a:p>
+            <a:r>
+              <a:rPr lang="en-US" dirty="0"/>
+              <a:t>Together, they let you build resilient, long-running processes that scale. Whether it’s approvals, data pipelines, or multi-agent orchestration—this pattern keeps your logic alive and reliable."</a:t>
+            </a:r>
+          </a:p>
+          <a:p>
+            <a:endParaRPr lang="en-AU" dirty="0"/>
+          </a:p>
+        </p:txBody>
+      </p:sp>
+      <p:sp>
+        <p:nvSpPr>
+          <p:cNvPr id="4" name="Slide Number Placeholder 3"/>
+          <p:cNvSpPr>
+            <a:spLocks noGrp="1"/>
+          </p:cNvSpPr>
+          <p:nvPr>
+            <p:ph type="sldNum" sz="quarter" idx="5"/>
+          </p:nvPr>
+        </p:nvSpPr>
+        <p:spPr/>
+        <p:txBody>
+          <a:bodyPr/>
+          <a:lstStyle/>
+          <a:p>
+            <a:fld id="{6197A77B-07D2-476D-AC96-9D1BD570262A}" type="slidenum">
+              <a:rPr lang="en-AU" smtClean="0"/>
+              <a:t>2</a:t>
+            </a:fld>
+            <a:endParaRPr lang="en-AU"/>
+          </a:p>
+        </p:txBody>
+      </p:sp>
+    </p:spTree>
+    <p:extLst>
+      <p:ext uri="{BB962C8B-B14F-4D97-AF65-F5344CB8AC3E}">
+        <p14:creationId xmlns:p14="http://schemas.microsoft.com/office/powerpoint/2010/main" val="1632214034"/>
+      </p:ext>
+    </p:extLst>
+  </p:cSld>
+  <p:clrMapOvr>
+    <a:masterClrMapping/>
+  </p:clrMapOvr>
+</p:notes>
+</file>
+
+<file path=ppt/notesSlides/notesSlide3.xml><?xml version="1.0" encoding="utf-8"?>
+<p:notes xmlns:a="http://schemas.openxmlformats.org/drawingml/2006/main" xmlns:r="http://schemas.openxmlformats.org/officeDocument/2006/relationships" xmlns:p="http://schemas.openxmlformats.org/presentationml/2006/main">
+  <p:cSld>
+    <p:spTree>
+      <p:nvGrpSpPr>
+        <p:cNvPr id="1" name=""/>
+        <p:cNvGrpSpPr/>
+        <p:nvPr/>
+      </p:nvGrpSpPr>
+      <p:grpSpPr>
+        <a:xfrm>
+          <a:off x="0" y="0"/>
+          <a:ext cx="0" cy="0"/>
+          <a:chOff x="0" y="0"/>
+          <a:chExt cx="0" cy="0"/>
+        </a:xfrm>
+      </p:grpSpPr>
+      <p:sp>
+        <p:nvSpPr>
+          <p:cNvPr id="2" name="Slide Image Placeholder 1"/>
+          <p:cNvSpPr>
+            <a:spLocks noGrp="1" noRot="1" noChangeAspect="1"/>
+          </p:cNvSpPr>
+          <p:nvPr>
+            <p:ph type="sldImg"/>
+          </p:nvPr>
+        </p:nvSpPr>
+        <p:spPr/>
+      </p:sp>
+      <p:sp>
+        <p:nvSpPr>
+          <p:cNvPr id="3" name="Notes Placeholder 2"/>
+          <p:cNvSpPr>
+            <a:spLocks noGrp="1"/>
+          </p:cNvSpPr>
+          <p:nvPr>
+            <p:ph type="body" idx="1"/>
+          </p:nvPr>
+        </p:nvSpPr>
+        <p:spPr/>
+        <p:txBody>
+          <a:bodyPr/>
+          <a:lstStyle/>
+          <a:p>
+            <a:r>
+              <a:rPr lang="en-AU" sz="1200" b="0" i="0" kern="1200" dirty="0" err="1">
+                <a:solidFill>
+                  <a:schemeClr val="tx1"/>
+                </a:solidFill>
+                <a:effectLst/>
+                <a:latin typeface="+mn-lt"/>
+                <a:ea typeface="+mn-ea"/>
+                <a:cs typeface="+mn-cs"/>
+              </a:rPr>
+              <a:t>Dapr</a:t>
+            </a:r>
+            <a:r>
+              <a:rPr lang="en-AU" sz="1200" b="0" i="0" kern="1200" dirty="0">
+                <a:solidFill>
+                  <a:schemeClr val="tx1"/>
+                </a:solidFill>
+                <a:effectLst/>
+                <a:latin typeface="+mn-lt"/>
+                <a:ea typeface="+mn-ea"/>
+                <a:cs typeface="+mn-cs"/>
+              </a:rPr>
+              <a:t> Agents supports both deterministic and event-driven workflows to manage multi-agent systems via </a:t>
+            </a:r>
+            <a:r>
+              <a:rPr lang="en-AU" sz="1200" b="0" i="0" u="none" strike="noStrike" kern="1200" dirty="0" err="1">
+                <a:solidFill>
+                  <a:schemeClr val="tx1"/>
+                </a:solidFill>
+                <a:effectLst/>
+                <a:latin typeface="+mn-lt"/>
+                <a:ea typeface="+mn-ea"/>
+                <a:cs typeface="+mn-cs"/>
+                <a:hlinkClick r:id="rId3"/>
+              </a:rPr>
+              <a:t>Dapr</a:t>
+            </a:r>
+            <a:r>
+              <a:rPr lang="en-AU" sz="1200" b="0" i="0" u="none" strike="noStrike" kern="1200" dirty="0">
+                <a:solidFill>
+                  <a:schemeClr val="tx1"/>
+                </a:solidFill>
+                <a:effectLst/>
+                <a:latin typeface="+mn-lt"/>
+                <a:ea typeface="+mn-ea"/>
+                <a:cs typeface="+mn-cs"/>
+                <a:hlinkClick r:id="rId3"/>
+              </a:rPr>
+              <a:t> Workflows</a:t>
+            </a:r>
+            <a:r>
+              <a:rPr lang="en-AU" sz="1200" b="0" i="0" kern="1200" dirty="0">
+                <a:solidFill>
+                  <a:schemeClr val="tx1"/>
+                </a:solidFill>
+                <a:effectLst/>
+                <a:latin typeface="+mn-lt"/>
+                <a:ea typeface="+mn-ea"/>
+                <a:cs typeface="+mn-cs"/>
+              </a:rPr>
+              <a:t>. Deterministic workflows provide clear, repeatable processes, while event-driven workflows allow for dynamic, adaptive collaboration between agents in centralized or decentralized architectures.</a:t>
+            </a:r>
+          </a:p>
+          <a:p>
+            <a:endParaRPr lang="en-AU" sz="1200" b="0" i="0" kern="1200" dirty="0">
+              <a:solidFill>
+                <a:schemeClr val="tx1"/>
+              </a:solidFill>
+              <a:effectLst/>
+              <a:latin typeface="+mn-lt"/>
+              <a:ea typeface="+mn-ea"/>
+              <a:cs typeface="+mn-cs"/>
+            </a:endParaRPr>
+          </a:p>
+          <a:p>
+            <a:endParaRPr lang="en-AU" dirty="0"/>
+          </a:p>
+        </p:txBody>
+      </p:sp>
+      <p:sp>
+        <p:nvSpPr>
+          <p:cNvPr id="4" name="Slide Number Placeholder 3"/>
+          <p:cNvSpPr>
+            <a:spLocks noGrp="1"/>
+          </p:cNvSpPr>
+          <p:nvPr>
+            <p:ph type="sldNum" sz="quarter" idx="5"/>
+          </p:nvPr>
+        </p:nvSpPr>
+        <p:spPr/>
+        <p:txBody>
+          <a:bodyPr/>
+          <a:lstStyle/>
+          <a:p>
+            <a:fld id="{6197A77B-07D2-476D-AC96-9D1BD570262A}" type="slidenum">
+              <a:rPr lang="en-AU" smtClean="0"/>
+              <a:t>3</a:t>
+            </a:fld>
+            <a:endParaRPr lang="en-AU"/>
+          </a:p>
+        </p:txBody>
+      </p:sp>
+    </p:spTree>
+    <p:extLst>
+      <p:ext uri="{BB962C8B-B14F-4D97-AF65-F5344CB8AC3E}">
+        <p14:creationId xmlns:p14="http://schemas.microsoft.com/office/powerpoint/2010/main" val="2606219233"/>
+      </p:ext>
+    </p:extLst>
+  </p:cSld>
+  <p:clrMapOvr>
+    <a:masterClrMapping/>
+  </p:clrMapOvr>
+</p:notes>
+</file>
+
+<file path=ppt/notesSlides/notesSlide4.xml><?xml version="1.0" encoding="utf-8"?>
+<p:notes xmlns:a="http://schemas.openxmlformats.org/drawingml/2006/main" xmlns:r="http://schemas.openxmlformats.org/officeDocument/2006/relationships" xmlns:p="http://schemas.openxmlformats.org/presentationml/2006/main">
+  <p:cSld>
+    <p:spTree>
+      <p:nvGrpSpPr>
+        <p:cNvPr id="1" name=""/>
+        <p:cNvGrpSpPr/>
+        <p:nvPr/>
+      </p:nvGrpSpPr>
+      <p:grpSpPr>
+        <a:xfrm>
+          <a:off x="0" y="0"/>
+          <a:ext cx="0" cy="0"/>
+          <a:chOff x="0" y="0"/>
+          <a:chExt cx="0" cy="0"/>
+        </a:xfrm>
+      </p:grpSpPr>
+      <p:sp>
+        <p:nvSpPr>
+          <p:cNvPr id="2" name="Slide Image Placeholder 1"/>
+          <p:cNvSpPr>
+            <a:spLocks noGrp="1" noRot="1" noChangeAspect="1"/>
+          </p:cNvSpPr>
+          <p:nvPr>
+            <p:ph type="sldImg"/>
+          </p:nvPr>
+        </p:nvSpPr>
+        <p:spPr/>
+      </p:sp>
+      <p:sp>
+        <p:nvSpPr>
+          <p:cNvPr id="3" name="Notes Placeholder 2"/>
+          <p:cNvSpPr>
+            <a:spLocks noGrp="1"/>
+          </p:cNvSpPr>
+          <p:nvPr>
+            <p:ph type="body" idx="1"/>
+          </p:nvPr>
+        </p:nvSpPr>
+        <p:spPr/>
+        <p:txBody>
+          <a:bodyPr/>
+          <a:lstStyle/>
+          <a:p>
+            <a:r>
+              <a:rPr lang="en-US" sz="1200" b="0" i="0" kern="1200" dirty="0" err="1">
+                <a:solidFill>
+                  <a:schemeClr val="tx1"/>
+                </a:solidFill>
+                <a:effectLst/>
+                <a:latin typeface="+mn-lt"/>
+                <a:ea typeface="+mn-ea"/>
+                <a:cs typeface="+mn-cs"/>
+              </a:rPr>
+              <a:t>DurableAgent</a:t>
+            </a:r>
+            <a:r>
+              <a:rPr lang="en-US" sz="1200" b="0" i="0" u="none" strike="noStrike" kern="1200" dirty="0">
+                <a:solidFill>
+                  <a:schemeClr val="tx1"/>
+                </a:solidFill>
+                <a:effectLst/>
+                <a:latin typeface="+mn-lt"/>
+                <a:ea typeface="+mn-ea"/>
+                <a:cs typeface="+mn-cs"/>
+                <a:hlinkClick r:id="rId3" tooltip="Permanent link"/>
+              </a:rPr>
+              <a:t>¶</a:t>
+            </a:r>
+            <a:endParaRPr lang="en-US" sz="1200" b="0" i="0" u="none" strike="noStrike" kern="1200" dirty="0">
+              <a:solidFill>
+                <a:schemeClr val="tx1"/>
+              </a:solidFill>
+              <a:effectLst/>
+              <a:latin typeface="+mn-lt"/>
+              <a:ea typeface="+mn-ea"/>
+              <a:cs typeface="+mn-cs"/>
+            </a:endParaRPr>
+          </a:p>
+          <a:p>
+            <a:endParaRPr lang="en-US" sz="1200" b="0" i="0" kern="1200" dirty="0">
+              <a:solidFill>
+                <a:schemeClr val="tx1"/>
+              </a:solidFill>
+              <a:effectLst/>
+              <a:latin typeface="+mn-lt"/>
+              <a:ea typeface="+mn-ea"/>
+              <a:cs typeface="+mn-cs"/>
+            </a:endParaRPr>
+          </a:p>
+          <a:p>
+            <a:r>
+              <a:rPr lang="en-US" sz="1200" b="0" i="0" kern="1200" dirty="0">
+                <a:solidFill>
+                  <a:schemeClr val="tx1"/>
+                </a:solidFill>
+                <a:effectLst/>
+                <a:latin typeface="+mn-lt"/>
+                <a:ea typeface="+mn-ea"/>
+                <a:cs typeface="+mn-cs"/>
+              </a:rPr>
+              <a:t>The </a:t>
+            </a:r>
+            <a:r>
+              <a:rPr lang="en-US" sz="1200" b="0" i="0" kern="1200" dirty="0" err="1">
+                <a:solidFill>
+                  <a:schemeClr val="tx1"/>
+                </a:solidFill>
+                <a:effectLst/>
+                <a:latin typeface="+mn-lt"/>
+                <a:ea typeface="+mn-ea"/>
+                <a:cs typeface="+mn-cs"/>
+              </a:rPr>
+              <a:t>DurableAgent</a:t>
+            </a:r>
+            <a:r>
+              <a:rPr lang="en-US" sz="1200" b="0" i="0" kern="1200" dirty="0">
+                <a:solidFill>
+                  <a:schemeClr val="tx1"/>
+                </a:solidFill>
+                <a:effectLst/>
+                <a:latin typeface="+mn-lt"/>
+                <a:ea typeface="+mn-ea"/>
+                <a:cs typeface="+mn-cs"/>
+              </a:rPr>
+              <a:t> class is a workflow-based agent that extends the standard Agent with </a:t>
+            </a:r>
+            <a:r>
+              <a:rPr lang="en-US" sz="1200" b="0" i="0" kern="1200" dirty="0" err="1">
+                <a:solidFill>
+                  <a:schemeClr val="tx1"/>
+                </a:solidFill>
+                <a:effectLst/>
+                <a:latin typeface="+mn-lt"/>
+                <a:ea typeface="+mn-ea"/>
+                <a:cs typeface="+mn-cs"/>
+              </a:rPr>
+              <a:t>Dapr</a:t>
+            </a:r>
+            <a:r>
+              <a:rPr lang="en-US" sz="1200" b="0" i="0" kern="1200" dirty="0">
+                <a:solidFill>
+                  <a:schemeClr val="tx1"/>
+                </a:solidFill>
+                <a:effectLst/>
+                <a:latin typeface="+mn-lt"/>
+                <a:ea typeface="+mn-ea"/>
+                <a:cs typeface="+mn-cs"/>
+              </a:rPr>
+              <a:t> Workflows for long-running, fault-tolerant, and durable execution. It provides persistent state management, automatic retry mechanisms, and deterministic execution across failures.</a:t>
+            </a:r>
+          </a:p>
+          <a:p>
+            <a:endParaRPr lang="en-US" sz="1200" b="0" i="0" kern="1200" dirty="0">
+              <a:solidFill>
+                <a:schemeClr val="tx1"/>
+              </a:solidFill>
+              <a:effectLst/>
+              <a:latin typeface="+mn-lt"/>
+              <a:ea typeface="+mn-ea"/>
+              <a:cs typeface="+mn-cs"/>
+            </a:endParaRPr>
+          </a:p>
+          <a:p>
+            <a:r>
+              <a:rPr lang="en-US" sz="1200" b="1" i="0" kern="1200" dirty="0">
+                <a:solidFill>
+                  <a:schemeClr val="tx1"/>
+                </a:solidFill>
+                <a:effectLst/>
+                <a:latin typeface="+mn-lt"/>
+                <a:ea typeface="+mn-ea"/>
+                <a:cs typeface="+mn-cs"/>
+              </a:rPr>
+              <a:t>Key Characteristics:</a:t>
+            </a:r>
+            <a:r>
+              <a:rPr lang="en-US" sz="1200" b="0" i="0" kern="1200" dirty="0">
+                <a:solidFill>
+                  <a:schemeClr val="tx1"/>
+                </a:solidFill>
+                <a:effectLst/>
+                <a:latin typeface="+mn-lt"/>
+                <a:ea typeface="+mn-ea"/>
+                <a:cs typeface="+mn-cs"/>
+              </a:rPr>
+              <a:t> - Workflow-based execution using </a:t>
+            </a:r>
+            <a:r>
+              <a:rPr lang="en-US" sz="1200" b="0" i="0" kern="1200" dirty="0" err="1">
+                <a:solidFill>
+                  <a:schemeClr val="tx1"/>
+                </a:solidFill>
+                <a:effectLst/>
+                <a:latin typeface="+mn-lt"/>
+                <a:ea typeface="+mn-ea"/>
+                <a:cs typeface="+mn-cs"/>
+              </a:rPr>
+              <a:t>Dapr</a:t>
+            </a:r>
+            <a:r>
+              <a:rPr lang="en-US" sz="1200" b="0" i="0" kern="1200" dirty="0">
+                <a:solidFill>
+                  <a:schemeClr val="tx1"/>
+                </a:solidFill>
+                <a:effectLst/>
+                <a:latin typeface="+mn-lt"/>
+                <a:ea typeface="+mn-ea"/>
+                <a:cs typeface="+mn-cs"/>
+              </a:rPr>
+              <a:t> Workflows - Persistent workflow state management across sessions and failures - Automatic retry and recovery mechanisms - Deterministic execution with checkpointing - Built-in message routing and agent communication - Supports complex orchestration patterns and multi-agent collaboration</a:t>
+            </a:r>
+          </a:p>
+          <a:p>
+            <a:endParaRPr lang="en-US" sz="1200" b="0" i="0" kern="1200" dirty="0">
+              <a:solidFill>
+                <a:schemeClr val="tx1"/>
+              </a:solidFill>
+              <a:effectLst/>
+              <a:latin typeface="+mn-lt"/>
+              <a:ea typeface="+mn-ea"/>
+              <a:cs typeface="+mn-cs"/>
+            </a:endParaRPr>
+          </a:p>
+          <a:p>
+            <a:r>
+              <a:rPr lang="en-US" sz="1200" b="1" i="0" kern="1200" dirty="0">
+                <a:solidFill>
+                  <a:schemeClr val="tx1"/>
+                </a:solidFill>
+                <a:effectLst/>
+                <a:latin typeface="+mn-lt"/>
+                <a:ea typeface="+mn-ea"/>
+                <a:cs typeface="+mn-cs"/>
+              </a:rPr>
+              <a:t>When to use:</a:t>
+            </a:r>
+            <a:r>
+              <a:rPr lang="en-US" sz="1200" b="0" i="0" kern="1200" dirty="0">
+                <a:solidFill>
+                  <a:schemeClr val="tx1"/>
+                </a:solidFill>
+                <a:effectLst/>
+                <a:latin typeface="+mn-lt"/>
+                <a:ea typeface="+mn-ea"/>
+                <a:cs typeface="+mn-cs"/>
+              </a:rPr>
+              <a:t> - Multi-step workflows that span time or systems - Tasks requiring guaranteed progress tracking and state persistence - Scenarios where operations may pause, fail, or need recovery without data loss - Complex agent orchestration and multi-agent collaboration - Production systems requiring fault tolerance and scalability</a:t>
+            </a:r>
+          </a:p>
+          <a:p>
+            <a:endParaRPr lang="en-AU" dirty="0"/>
+          </a:p>
+        </p:txBody>
+      </p:sp>
+      <p:sp>
+        <p:nvSpPr>
+          <p:cNvPr id="4" name="Slide Number Placeholder 3"/>
+          <p:cNvSpPr>
+            <a:spLocks noGrp="1"/>
+          </p:cNvSpPr>
+          <p:nvPr>
+            <p:ph type="sldNum" sz="quarter" idx="5"/>
+          </p:nvPr>
+        </p:nvSpPr>
+        <p:spPr/>
+        <p:txBody>
+          <a:bodyPr/>
+          <a:lstStyle/>
+          <a:p>
+            <a:fld id="{6197A77B-07D2-476D-AC96-9D1BD570262A}" type="slidenum">
+              <a:rPr lang="en-AU" smtClean="0"/>
+              <a:t>4</a:t>
+            </a:fld>
+            <a:endParaRPr lang="en-AU"/>
+          </a:p>
+        </p:txBody>
+      </p:sp>
+    </p:spTree>
+    <p:extLst>
+      <p:ext uri="{BB962C8B-B14F-4D97-AF65-F5344CB8AC3E}">
+        <p14:creationId xmlns:p14="http://schemas.microsoft.com/office/powerpoint/2010/main" val="4020154238"/>
+      </p:ext>
+    </p:extLst>
+  </p:cSld>
+  <p:clrMapOvr>
+    <a:masterClrMapping/>
+  </p:clrMapOvr>
+</p:notes>
+</file>
+
+<file path=ppt/notesSlides/notesSlide5.xml><?xml version="1.0" encoding="utf-8"?>
+<p:notes xmlns:a="http://schemas.openxmlformats.org/drawingml/2006/main" xmlns:r="http://schemas.openxmlformats.org/officeDocument/2006/relationships" xmlns:p="http://schemas.openxmlformats.org/presentationml/2006/main">
+  <p:cSld>
+    <p:spTree>
+      <p:nvGrpSpPr>
+        <p:cNvPr id="1" name=""/>
+        <p:cNvGrpSpPr/>
+        <p:nvPr/>
+      </p:nvGrpSpPr>
+      <p:grpSpPr>
+        <a:xfrm>
+          <a:off x="0" y="0"/>
+          <a:ext cx="0" cy="0"/>
+          <a:chOff x="0" y="0"/>
+          <a:chExt cx="0" cy="0"/>
+        </a:xfrm>
+      </p:grpSpPr>
+      <p:sp>
+        <p:nvSpPr>
+          <p:cNvPr id="2" name="Slide Image Placeholder 1"/>
+          <p:cNvSpPr>
+            <a:spLocks noGrp="1" noRot="1" noChangeAspect="1"/>
+          </p:cNvSpPr>
+          <p:nvPr>
+            <p:ph type="sldImg"/>
+          </p:nvPr>
+        </p:nvSpPr>
+        <p:spPr/>
+      </p:sp>
+      <p:sp>
+        <p:nvSpPr>
+          <p:cNvPr id="3" name="Notes Placeholder 2"/>
+          <p:cNvSpPr>
+            <a:spLocks noGrp="1"/>
+          </p:cNvSpPr>
+          <p:nvPr>
+            <p:ph type="body" idx="1"/>
+          </p:nvPr>
+        </p:nvSpPr>
+        <p:spPr/>
+        <p:txBody>
+          <a:bodyPr/>
+          <a:lstStyle/>
+          <a:p>
+            <a:r>
+              <a:rPr lang="en-US" sz="1200" b="0" i="0" kern="1200" dirty="0">
+                <a:solidFill>
+                  <a:schemeClr val="tx1"/>
+                </a:solidFill>
+                <a:effectLst/>
+                <a:latin typeface="+mn-lt"/>
+                <a:ea typeface="+mn-ea"/>
+                <a:cs typeface="+mn-cs"/>
+              </a:rPr>
+              <a:t>workflows enable the coordination of multiple agents to achieve shared goals. In </a:t>
+            </a:r>
+            <a:r>
+              <a:rPr lang="en-US" sz="1200" b="0" i="0" kern="1200" dirty="0" err="1">
+                <a:solidFill>
+                  <a:schemeClr val="tx1"/>
+                </a:solidFill>
+                <a:effectLst/>
+                <a:latin typeface="+mn-lt"/>
+                <a:ea typeface="+mn-ea"/>
+                <a:cs typeface="+mn-cs"/>
+              </a:rPr>
+              <a:t>Dapr</a:t>
+            </a:r>
+            <a:r>
+              <a:rPr lang="en-US" sz="1200" b="0" i="0" kern="1200" dirty="0">
+                <a:solidFill>
+                  <a:schemeClr val="tx1"/>
+                </a:solidFill>
+                <a:effectLst/>
+                <a:latin typeface="+mn-lt"/>
+                <a:ea typeface="+mn-ea"/>
+                <a:cs typeface="+mn-cs"/>
+              </a:rPr>
+              <a:t> Agents, workflows serve as a higher-level framework for organizing how agents collaborate and distribute tasks.</a:t>
+            </a:r>
+          </a:p>
+          <a:p>
+            <a:endParaRPr lang="en-US" sz="1200" b="0" i="0" kern="1200" dirty="0">
+              <a:solidFill>
+                <a:schemeClr val="tx1"/>
+              </a:solidFill>
+              <a:effectLst/>
+              <a:latin typeface="+mn-lt"/>
+              <a:ea typeface="+mn-ea"/>
+              <a:cs typeface="+mn-cs"/>
+            </a:endParaRPr>
+          </a:p>
+          <a:p>
+            <a:r>
+              <a:rPr lang="en-US" sz="1200" b="0" i="0" kern="1200" dirty="0">
+                <a:solidFill>
+                  <a:schemeClr val="tx1"/>
+                </a:solidFill>
+                <a:effectLst/>
+                <a:latin typeface="+mn-lt"/>
+                <a:ea typeface="+mn-ea"/>
+                <a:cs typeface="+mn-cs"/>
+              </a:rPr>
+              <a:t>Workflows can orchestrate agents, each equipped with their own built-in patterns, to handle different parts of a larger process. For example, one agent might gather data using tools, another might analyze the results, and a third might generate a report. The workflow manages the communication and sequencing between these agents, ensuring smooth collaboration.</a:t>
+            </a:r>
+          </a:p>
+          <a:p>
+            <a:endParaRPr lang="en-US" sz="1200" b="0" i="0" kern="1200" dirty="0">
+              <a:solidFill>
+                <a:schemeClr val="tx1"/>
+              </a:solidFill>
+              <a:effectLst/>
+              <a:latin typeface="+mn-lt"/>
+              <a:ea typeface="+mn-ea"/>
+              <a:cs typeface="+mn-cs"/>
+            </a:endParaRPr>
+          </a:p>
+          <a:p>
+            <a:r>
+              <a:rPr lang="en-US" sz="1200" b="0" i="0" kern="1200" dirty="0">
+                <a:solidFill>
+                  <a:schemeClr val="tx1"/>
+                </a:solidFill>
+                <a:effectLst/>
+                <a:latin typeface="+mn-lt"/>
+                <a:ea typeface="+mn-ea"/>
+                <a:cs typeface="+mn-cs"/>
+              </a:rPr>
+              <a:t>Workflows can also define loops similar to agent patterns. Instead of relying on an agent’s built-in tool-calling loop, you can design workflows to orchestrate tool usage, reasoning, and action. This gives you the flexibility to use workflows to define both multi-agent collaboration and complex task handling for a single agent.</a:t>
+            </a:r>
+          </a:p>
+          <a:p>
+            <a:endParaRPr lang="en-US" sz="1200" b="0" i="0" kern="1200" dirty="0">
+              <a:solidFill>
+                <a:schemeClr val="tx1"/>
+              </a:solidFill>
+              <a:effectLst/>
+              <a:latin typeface="+mn-lt"/>
+              <a:ea typeface="+mn-ea"/>
+              <a:cs typeface="+mn-cs"/>
+            </a:endParaRPr>
+          </a:p>
+          <a:p>
+            <a:r>
+              <a:rPr lang="en-US" sz="1200" b="0" i="0" kern="1200" dirty="0">
+                <a:solidFill>
+                  <a:schemeClr val="tx1"/>
+                </a:solidFill>
+                <a:effectLst/>
+                <a:latin typeface="+mn-lt"/>
+                <a:ea typeface="+mn-ea"/>
+                <a:cs typeface="+mn-cs"/>
+              </a:rPr>
+              <a:t>Random Workflow</a:t>
+            </a:r>
+            <a:r>
+              <a:rPr lang="en-US" sz="1200" b="0" i="0" u="none" strike="noStrike" kern="1200" dirty="0">
+                <a:solidFill>
+                  <a:schemeClr val="tx1"/>
+                </a:solidFill>
+                <a:effectLst/>
+                <a:latin typeface="+mn-lt"/>
+                <a:ea typeface="+mn-ea"/>
+                <a:cs typeface="+mn-cs"/>
+                <a:hlinkClick r:id="rId3" tooltip="Permanent link"/>
+              </a:rPr>
+              <a:t>¶</a:t>
+            </a:r>
+            <a:endParaRPr lang="en-US" sz="1200" b="0" i="0" kern="1200" dirty="0">
+              <a:solidFill>
+                <a:schemeClr val="tx1"/>
+              </a:solidFill>
+              <a:effectLst/>
+              <a:latin typeface="+mn-lt"/>
+              <a:ea typeface="+mn-ea"/>
+              <a:cs typeface="+mn-cs"/>
+            </a:endParaRPr>
+          </a:p>
+          <a:p>
+            <a:r>
+              <a:rPr lang="en-US" sz="1200" b="0" i="0" kern="1200" dirty="0">
+                <a:solidFill>
+                  <a:schemeClr val="tx1"/>
+                </a:solidFill>
+                <a:effectLst/>
+                <a:latin typeface="+mn-lt"/>
+                <a:ea typeface="+mn-ea"/>
+                <a:cs typeface="+mn-cs"/>
+              </a:rPr>
+              <a:t>In a Random Workflow, the next agent to handle a task is selected randomly. This approach:</a:t>
+            </a:r>
+          </a:p>
+          <a:p>
+            <a:r>
+              <a:rPr lang="en-US" sz="1200" b="0" i="0" kern="1200" dirty="0">
+                <a:solidFill>
+                  <a:schemeClr val="tx1"/>
+                </a:solidFill>
+                <a:effectLst/>
+                <a:latin typeface="+mn-lt"/>
+                <a:ea typeface="+mn-ea"/>
+                <a:cs typeface="+mn-cs"/>
+              </a:rPr>
+              <a:t>Encourages diversity in agent responses and strategies.</a:t>
+            </a:r>
+          </a:p>
+          <a:p>
+            <a:r>
+              <a:rPr lang="en-US" sz="1200" b="0" i="0" kern="1200" dirty="0">
+                <a:solidFill>
+                  <a:schemeClr val="tx1"/>
+                </a:solidFill>
+                <a:effectLst/>
+                <a:latin typeface="+mn-lt"/>
+                <a:ea typeface="+mn-ea"/>
+                <a:cs typeface="+mn-cs"/>
+              </a:rPr>
+              <a:t>Simplifies orchestration in cases where task assignment does not depend on specific agent roles or expertise.</a:t>
+            </a:r>
+          </a:p>
+          <a:p>
+            <a:r>
+              <a:rPr lang="en-US" sz="1200" b="0" i="0" kern="1200" dirty="0">
+                <a:solidFill>
+                  <a:schemeClr val="tx1"/>
+                </a:solidFill>
+                <a:effectLst/>
+                <a:latin typeface="+mn-lt"/>
+                <a:ea typeface="+mn-ea"/>
+                <a:cs typeface="+mn-cs"/>
+              </a:rPr>
+              <a:t>Random workflows are particularly useful for exploratory tasks or brainstorming scenarios where agent collaboration benefits from randomness.</a:t>
+            </a:r>
+          </a:p>
+          <a:p>
+            <a:endParaRPr lang="en-US" sz="1200" b="0" i="0" kern="1200" dirty="0">
+              <a:solidFill>
+                <a:schemeClr val="tx1"/>
+              </a:solidFill>
+              <a:effectLst/>
+              <a:latin typeface="+mn-lt"/>
+              <a:ea typeface="+mn-ea"/>
+              <a:cs typeface="+mn-cs"/>
+            </a:endParaRPr>
+          </a:p>
+          <a:p>
+            <a:r>
+              <a:rPr lang="en-US" sz="1200" b="0" i="0" kern="1200" dirty="0">
+                <a:solidFill>
+                  <a:schemeClr val="tx1"/>
+                </a:solidFill>
+                <a:effectLst/>
+                <a:latin typeface="+mn-lt"/>
+                <a:ea typeface="+mn-ea"/>
+                <a:cs typeface="+mn-cs"/>
+              </a:rPr>
+              <a:t>Round Robin Workflow</a:t>
+            </a:r>
+            <a:r>
+              <a:rPr lang="en-US" sz="1200" b="0" i="0" u="none" strike="noStrike" kern="1200" dirty="0">
+                <a:solidFill>
+                  <a:schemeClr val="tx1"/>
+                </a:solidFill>
+                <a:effectLst/>
+                <a:latin typeface="+mn-lt"/>
+                <a:ea typeface="+mn-ea"/>
+                <a:cs typeface="+mn-cs"/>
+                <a:hlinkClick r:id="rId4" tooltip="Permanent link"/>
+              </a:rPr>
+              <a:t>¶</a:t>
+            </a:r>
+            <a:endParaRPr lang="en-US" sz="1200" b="0" i="0" kern="1200" dirty="0">
+              <a:solidFill>
+                <a:schemeClr val="tx1"/>
+              </a:solidFill>
+              <a:effectLst/>
+              <a:latin typeface="+mn-lt"/>
+              <a:ea typeface="+mn-ea"/>
+              <a:cs typeface="+mn-cs"/>
+            </a:endParaRPr>
+          </a:p>
+          <a:p>
+            <a:r>
+              <a:rPr lang="en-US" sz="1200" b="0" i="0" kern="1200" dirty="0">
+                <a:solidFill>
+                  <a:schemeClr val="tx1"/>
+                </a:solidFill>
+                <a:effectLst/>
+                <a:latin typeface="+mn-lt"/>
+                <a:ea typeface="+mn-ea"/>
+                <a:cs typeface="+mn-cs"/>
+              </a:rPr>
+              <a:t>The Round Robin Workflow assigns tasks sequentially to agents in a fixed order. This method:</a:t>
+            </a:r>
+          </a:p>
+          <a:p>
+            <a:r>
+              <a:rPr lang="en-US" sz="1200" b="0" i="0" kern="1200" dirty="0">
+                <a:solidFill>
+                  <a:schemeClr val="tx1"/>
+                </a:solidFill>
+                <a:effectLst/>
+                <a:latin typeface="+mn-lt"/>
+                <a:ea typeface="+mn-ea"/>
+                <a:cs typeface="+mn-cs"/>
+              </a:rPr>
+              <a:t>Ensures equal participation among agents.</a:t>
+            </a:r>
+          </a:p>
+          <a:p>
+            <a:r>
+              <a:rPr lang="en-US" sz="1200" b="0" i="0" kern="1200" dirty="0">
+                <a:solidFill>
+                  <a:schemeClr val="tx1"/>
+                </a:solidFill>
+                <a:effectLst/>
+                <a:latin typeface="+mn-lt"/>
+                <a:ea typeface="+mn-ea"/>
+                <a:cs typeface="+mn-cs"/>
+              </a:rPr>
+              <a:t>Is ideal for scenarios requiring predictable task distribution, such as routine monitoring or repetitive processes.</a:t>
+            </a:r>
+          </a:p>
+          <a:p>
+            <a:r>
+              <a:rPr lang="en-US" sz="1200" b="0" i="0" kern="1200" dirty="0">
+                <a:solidFill>
+                  <a:schemeClr val="tx1"/>
+                </a:solidFill>
+                <a:effectLst/>
+                <a:latin typeface="+mn-lt"/>
+                <a:ea typeface="+mn-ea"/>
+                <a:cs typeface="+mn-cs"/>
+              </a:rPr>
+              <a:t>For example, in a team of monitoring agents, each agent takes turns analyzing incoming data streams in a predefined order.</a:t>
+            </a:r>
+          </a:p>
+          <a:p>
+            <a:endParaRPr lang="en-US" sz="1200" b="0" i="0" kern="1200" dirty="0">
+              <a:solidFill>
+                <a:schemeClr val="tx1"/>
+              </a:solidFill>
+              <a:effectLst/>
+              <a:latin typeface="+mn-lt"/>
+              <a:ea typeface="+mn-ea"/>
+              <a:cs typeface="+mn-cs"/>
+            </a:endParaRPr>
+          </a:p>
+          <a:p>
+            <a:r>
+              <a:rPr lang="en-US" sz="1200" b="0" i="0" kern="1200" dirty="0">
+                <a:solidFill>
+                  <a:schemeClr val="tx1"/>
+                </a:solidFill>
+                <a:effectLst/>
+                <a:latin typeface="+mn-lt"/>
+                <a:ea typeface="+mn-ea"/>
+                <a:cs typeface="+mn-cs"/>
+              </a:rPr>
+              <a:t>LLM-Based Workflow</a:t>
+            </a:r>
+            <a:r>
+              <a:rPr lang="en-US" sz="1200" b="0" i="0" u="none" strike="noStrike" kern="1200" dirty="0">
+                <a:solidFill>
+                  <a:schemeClr val="tx1"/>
+                </a:solidFill>
+                <a:effectLst/>
+                <a:latin typeface="+mn-lt"/>
+                <a:ea typeface="+mn-ea"/>
+                <a:cs typeface="+mn-cs"/>
+                <a:hlinkClick r:id="rId5" tooltip="Permanent link"/>
+              </a:rPr>
+              <a:t>¶</a:t>
+            </a:r>
+            <a:endParaRPr lang="en-US" sz="1200" b="0" i="0" kern="1200" dirty="0">
+              <a:solidFill>
+                <a:schemeClr val="tx1"/>
+              </a:solidFill>
+              <a:effectLst/>
+              <a:latin typeface="+mn-lt"/>
+              <a:ea typeface="+mn-ea"/>
+              <a:cs typeface="+mn-cs"/>
+            </a:endParaRPr>
+          </a:p>
+          <a:p>
+            <a:r>
+              <a:rPr lang="en-US" sz="1200" b="0" i="0" kern="1200" dirty="0">
+                <a:solidFill>
+                  <a:schemeClr val="tx1"/>
+                </a:solidFill>
+                <a:effectLst/>
+                <a:latin typeface="+mn-lt"/>
+                <a:ea typeface="+mn-ea"/>
+                <a:cs typeface="+mn-cs"/>
+              </a:rPr>
+              <a:t>The LLM-Based Workflow relies on the reasoning capabilities of an LLM to dynamically choose the next agent based on:</a:t>
+            </a:r>
+          </a:p>
+          <a:p>
+            <a:r>
+              <a:rPr lang="en-US" sz="1200" b="0" i="0" kern="1200" dirty="0">
+                <a:solidFill>
+                  <a:schemeClr val="tx1"/>
+                </a:solidFill>
+                <a:effectLst/>
+                <a:latin typeface="+mn-lt"/>
+                <a:ea typeface="+mn-ea"/>
+                <a:cs typeface="+mn-cs"/>
+              </a:rPr>
+              <a:t>Task Context: The nature and requirements of the current task.</a:t>
+            </a:r>
+          </a:p>
+          <a:p>
+            <a:r>
+              <a:rPr lang="en-US" sz="1200" b="0" i="0" kern="1200" dirty="0">
+                <a:solidFill>
+                  <a:schemeClr val="tx1"/>
+                </a:solidFill>
+                <a:effectLst/>
+                <a:latin typeface="+mn-lt"/>
+                <a:ea typeface="+mn-ea"/>
+                <a:cs typeface="+mn-cs"/>
+              </a:rPr>
+              <a:t>Chat History: Previous agent responses and interactions.</a:t>
+            </a:r>
+          </a:p>
+          <a:p>
+            <a:r>
+              <a:rPr lang="en-US" sz="1200" b="0" i="0" kern="1200" dirty="0">
+                <a:solidFill>
+                  <a:schemeClr val="tx1"/>
+                </a:solidFill>
+                <a:effectLst/>
+                <a:latin typeface="+mn-lt"/>
+                <a:ea typeface="+mn-ea"/>
+                <a:cs typeface="+mn-cs"/>
+              </a:rPr>
+              <a:t>Agent Metadata: Attributes like expertise, availability, or priorities.</a:t>
+            </a:r>
+          </a:p>
+          <a:p>
+            <a:r>
+              <a:rPr lang="en-US" sz="1200" b="0" i="0" kern="1200" dirty="0">
+                <a:solidFill>
+                  <a:schemeClr val="tx1"/>
+                </a:solidFill>
+                <a:effectLst/>
+                <a:latin typeface="+mn-lt"/>
+                <a:ea typeface="+mn-ea"/>
+                <a:cs typeface="+mn-cs"/>
+              </a:rPr>
+              <a:t>This approach ensures that the most suitable agent is selected for each task, optimizing collaboration and efficiency. For example, in a multi-agent customer support system, the LLM can assign tasks to agents based on customer issues, agent expertise, and workload distribution.</a:t>
+            </a:r>
+          </a:p>
+          <a:p>
+            <a:endParaRPr lang="en-US" sz="1200" b="0" i="0" kern="1200" dirty="0">
+              <a:solidFill>
+                <a:schemeClr val="tx1"/>
+              </a:solidFill>
+              <a:effectLst/>
+              <a:latin typeface="+mn-lt"/>
+              <a:ea typeface="+mn-ea"/>
+              <a:cs typeface="+mn-cs"/>
+            </a:endParaRPr>
+          </a:p>
+          <a:p>
+            <a:endParaRPr lang="en-US" sz="1200" b="0" i="0" kern="1200" dirty="0">
+              <a:solidFill>
+                <a:schemeClr val="tx1"/>
+              </a:solidFill>
+              <a:effectLst/>
+              <a:latin typeface="+mn-lt"/>
+              <a:ea typeface="+mn-ea"/>
+              <a:cs typeface="+mn-cs"/>
+            </a:endParaRPr>
+          </a:p>
+          <a:p>
+            <a:endParaRPr lang="en-US" sz="1200" b="0" i="0" kern="1200" dirty="0">
+              <a:solidFill>
+                <a:schemeClr val="tx1"/>
+              </a:solidFill>
+              <a:effectLst/>
+              <a:latin typeface="+mn-lt"/>
+              <a:ea typeface="+mn-ea"/>
+              <a:cs typeface="+mn-cs"/>
+            </a:endParaRPr>
+          </a:p>
+          <a:p>
+            <a:endParaRPr lang="en-AU" dirty="0"/>
+          </a:p>
+        </p:txBody>
+      </p:sp>
+      <p:sp>
+        <p:nvSpPr>
+          <p:cNvPr id="4" name="Slide Number Placeholder 3"/>
+          <p:cNvSpPr>
+            <a:spLocks noGrp="1"/>
+          </p:cNvSpPr>
+          <p:nvPr>
+            <p:ph type="sldNum" sz="quarter" idx="5"/>
+          </p:nvPr>
+        </p:nvSpPr>
+        <p:spPr/>
+        <p:txBody>
+          <a:bodyPr/>
+          <a:lstStyle/>
+          <a:p>
+            <a:fld id="{6197A77B-07D2-476D-AC96-9D1BD570262A}" type="slidenum">
+              <a:rPr lang="en-AU" smtClean="0"/>
+              <a:t>5</a:t>
+            </a:fld>
+            <a:endParaRPr lang="en-AU"/>
+          </a:p>
+        </p:txBody>
+      </p:sp>
+    </p:spTree>
+    <p:extLst>
+      <p:ext uri="{BB962C8B-B14F-4D97-AF65-F5344CB8AC3E}">
+        <p14:creationId xmlns:p14="http://schemas.microsoft.com/office/powerpoint/2010/main" val="4001223873"/>
+      </p:ext>
+    </p:extLst>
+  </p:cSld>
+  <p:clrMapOvr>
+    <a:masterClrMapping/>
+  </p:clrMapOvr>
+</p:notes>
+</file>
+
+<file path=ppt/notesSlides/notesSlide6.xml><?xml version="1.0" encoding="utf-8"?>
+<p:notes xmlns:a="http://schemas.openxmlformats.org/drawingml/2006/main" xmlns:r="http://schemas.openxmlformats.org/officeDocument/2006/relationships" xmlns:p="http://schemas.openxmlformats.org/presentationml/2006/main">
+  <p:cSld>
+    <p:spTree>
+      <p:nvGrpSpPr>
+        <p:cNvPr id="1" name=""/>
+        <p:cNvGrpSpPr/>
+        <p:nvPr/>
+      </p:nvGrpSpPr>
+      <p:grpSpPr>
+        <a:xfrm>
+          <a:off x="0" y="0"/>
+          <a:ext cx="0" cy="0"/>
+          <a:chOff x="0" y="0"/>
+          <a:chExt cx="0" cy="0"/>
+        </a:xfrm>
+      </p:grpSpPr>
+      <p:sp>
+        <p:nvSpPr>
+          <p:cNvPr id="2" name="Slide Image Placeholder 1"/>
+          <p:cNvSpPr>
+            <a:spLocks noGrp="1" noRot="1" noChangeAspect="1"/>
+          </p:cNvSpPr>
+          <p:nvPr>
+            <p:ph type="sldImg"/>
+          </p:nvPr>
+        </p:nvSpPr>
+        <p:spPr/>
+      </p:sp>
+      <p:sp>
+        <p:nvSpPr>
+          <p:cNvPr id="3" name="Notes Placeholder 2"/>
+          <p:cNvSpPr>
+            <a:spLocks noGrp="1"/>
+          </p:cNvSpPr>
+          <p:nvPr>
+            <p:ph type="body" idx="1"/>
+          </p:nvPr>
+        </p:nvSpPr>
+        <p:spPr/>
+        <p:txBody>
+          <a:bodyPr/>
+          <a:lstStyle/>
+          <a:p>
+            <a:r>
+              <a:rPr lang="en-AU" dirty="0"/>
+              <a:t>Let’s dive into some code – In this demo I’m going to show you have we can use Agentic workflows to orchestrate both sequential and parallel tasks using </a:t>
+            </a:r>
+            <a:r>
+              <a:rPr lang="en-AU" dirty="0" err="1"/>
+              <a:t>Dapr</a:t>
+            </a:r>
+            <a:r>
+              <a:rPr lang="en-AU" dirty="0"/>
+              <a:t> Agent’s workflow capabilities in Large-Language Model based workflows</a:t>
+            </a:r>
+          </a:p>
+          <a:p>
+            <a:endParaRPr lang="en-AU" dirty="0"/>
+          </a:p>
+          <a:p>
+            <a:endParaRPr lang="en-AU" dirty="0"/>
+          </a:p>
+        </p:txBody>
+      </p:sp>
+      <p:sp>
+        <p:nvSpPr>
+          <p:cNvPr id="4" name="Slide Number Placeholder 3"/>
+          <p:cNvSpPr>
+            <a:spLocks noGrp="1"/>
+          </p:cNvSpPr>
+          <p:nvPr>
+            <p:ph type="sldNum" sz="quarter" idx="5"/>
+          </p:nvPr>
+        </p:nvSpPr>
+        <p:spPr/>
+        <p:txBody>
+          <a:bodyPr/>
+          <a:lstStyle/>
+          <a:p>
+            <a:fld id="{6197A77B-07D2-476D-AC96-9D1BD570262A}" type="slidenum">
+              <a:rPr lang="en-AU" smtClean="0"/>
+              <a:t>6</a:t>
+            </a:fld>
+            <a:endParaRPr lang="en-AU"/>
+          </a:p>
+        </p:txBody>
+      </p:sp>
+    </p:spTree>
+    <p:extLst>
+      <p:ext uri="{BB962C8B-B14F-4D97-AF65-F5344CB8AC3E}">
+        <p14:creationId xmlns:p14="http://schemas.microsoft.com/office/powerpoint/2010/main" val="2196699755"/>
+      </p:ext>
+    </p:extLst>
+  </p:cSld>
+  <p:clrMapOvr>
+    <a:masterClrMapping/>
+  </p:clrMapOvr>
+</p:notes>
+</file>
+
 <file path=ppt/slideLayouts/slideLayout1.xml><?xml version="1.0" encoding="utf-8"?>
 <p:sldLayout xmlns:a="http://schemas.openxmlformats.org/drawingml/2006/main" xmlns:r="http://schemas.openxmlformats.org/officeDocument/2006/relationships" xmlns:p="http://schemas.openxmlformats.org/presentationml/2006/main" showMasterSp="0" type="title" preserve="1">
   <p:cSld name="Title Slide">
@@ -28046,7 +29776,7 @@
           <p:cNvPr id="4" name="Rectangle 3">
             <a:extLst>
               <a:ext uri="{FF2B5EF4-FFF2-40B4-BE49-F238E27FC236}">
-                <a16:creationId xmlns:a16="http://schemas.microsoft.com/office/drawing/2014/main" id="{31E6AA85-1E54-5F0C-E499-4F66D76AA329}"/>
+                <a16:creationId xmlns:a16="http://schemas.microsoft.com/office/drawing/2014/main" id="{15D73C47-2770-30A3-51F7-BA0B51D668C7}"/>
               </a:ext>
             </a:extLst>
           </p:cNvPr>
@@ -28087,129 +29817,6 @@
           </a:p>
         </p:txBody>
       </p:sp>
-      <p:pic>
-        <p:nvPicPr>
-          <p:cNvPr id="1026" name="Picture 2" descr="Home - Dapr Agents">
-            <a:extLst>
-              <a:ext uri="{FF2B5EF4-FFF2-40B4-BE49-F238E27FC236}">
-                <a16:creationId xmlns:a16="http://schemas.microsoft.com/office/drawing/2014/main" id="{3EA83C2E-55C9-5BAA-9DA7-6F7EAF3DADA5}"/>
-              </a:ext>
-            </a:extLst>
-          </p:cNvPr>
-          <p:cNvPicPr>
-            <a:picLocks noChangeAspect="1" noChangeArrowheads="1"/>
-          </p:cNvPicPr>
-          <p:nvPr/>
-        </p:nvPicPr>
-        <p:blipFill>
-          <a:blip r:embed="rId2">
-            <a:extLst>
-              <a:ext uri="{28A0092B-C50C-407E-A947-70E740481C1C}">
-                <a14:useLocalDpi xmlns:a14="http://schemas.microsoft.com/office/drawing/2010/main" val="0"/>
-              </a:ext>
-            </a:extLst>
-          </a:blip>
-          <a:srcRect/>
-          <a:stretch>
-            <a:fillRect/>
-          </a:stretch>
-        </p:blipFill>
-        <p:spPr bwMode="auto">
-          <a:xfrm>
-            <a:off x="2006930" y="942820"/>
-            <a:ext cx="4972360" cy="4972360"/>
-          </a:xfrm>
-          <a:prstGeom prst="rect">
-            <a:avLst/>
-          </a:prstGeom>
-          <a:noFill/>
-          <a:extLst>
-            <a:ext uri="{909E8E84-426E-40DD-AFC4-6F175D3DCCD1}">
-              <a14:hiddenFill xmlns:a14="http://schemas.microsoft.com/office/drawing/2010/main">
-                <a:solidFill>
-                  <a:srgbClr val="FFFFFF"/>
-                </a:solidFill>
-              </a14:hiddenFill>
-            </a:ext>
-          </a:extLst>
-        </p:spPr>
-      </p:pic>
-    </p:spTree>
-    <p:extLst>
-      <p:ext uri="{BB962C8B-B14F-4D97-AF65-F5344CB8AC3E}">
-        <p14:creationId xmlns:p14="http://schemas.microsoft.com/office/powerpoint/2010/main" val="1130843247"/>
-      </p:ext>
-    </p:extLst>
-  </p:cSld>
-  <p:clrMapOvr>
-    <a:masterClrMapping/>
-  </p:clrMapOvr>
-</p:sld>
-</file>
-
-<file path=ppt/slides/slide2.xml><?xml version="1.0" encoding="utf-8"?>
-<p:sld xmlns:a="http://schemas.openxmlformats.org/drawingml/2006/main" xmlns:r="http://schemas.openxmlformats.org/officeDocument/2006/relationships" xmlns:p="http://schemas.openxmlformats.org/presentationml/2006/main">
-  <p:cSld>
-    <p:spTree>
-      <p:nvGrpSpPr>
-        <p:cNvPr id="1" name=""/>
-        <p:cNvGrpSpPr/>
-        <p:nvPr/>
-      </p:nvGrpSpPr>
-      <p:grpSpPr>
-        <a:xfrm>
-          <a:off x="0" y="0"/>
-          <a:ext cx="0" cy="0"/>
-          <a:chOff x="0" y="0"/>
-          <a:chExt cx="0" cy="0"/>
-        </a:xfrm>
-      </p:grpSpPr>
-      <p:sp>
-        <p:nvSpPr>
-          <p:cNvPr id="4" name="Rectangle 3">
-            <a:extLst>
-              <a:ext uri="{FF2B5EF4-FFF2-40B4-BE49-F238E27FC236}">
-                <a16:creationId xmlns:a16="http://schemas.microsoft.com/office/drawing/2014/main" id="{15D73C47-2770-30A3-51F7-BA0B51D668C7}"/>
-              </a:ext>
-            </a:extLst>
-          </p:cNvPr>
-          <p:cNvSpPr/>
-          <p:nvPr/>
-        </p:nvSpPr>
-        <p:spPr>
-          <a:xfrm>
-            <a:off x="8953995" y="3764478"/>
-            <a:ext cx="3238005" cy="3093522"/>
-          </a:xfrm>
-          <a:prstGeom prst="rect">
-            <a:avLst/>
-          </a:prstGeom>
-        </p:spPr>
-        <p:style>
-          <a:lnRef idx="2">
-            <a:schemeClr val="accent1">
-              <a:shade val="15000"/>
-            </a:schemeClr>
-          </a:lnRef>
-          <a:fillRef idx="1">
-            <a:schemeClr val="accent1"/>
-          </a:fillRef>
-          <a:effectRef idx="0">
-            <a:schemeClr val="accent1"/>
-          </a:effectRef>
-          <a:fontRef idx="minor">
-            <a:schemeClr val="lt1"/>
-          </a:fontRef>
-        </p:style>
-        <p:txBody>
-          <a:bodyPr rtlCol="0" anchor="ctr"/>
-          <a:lstStyle/>
-          <a:p>
-            <a:pPr algn="ctr"/>
-            <a:endParaRPr lang="en-AU"/>
-          </a:p>
-        </p:txBody>
-      </p:sp>
       <p:graphicFrame>
         <p:nvGraphicFramePr>
           <p:cNvPr id="5" name="Diagram 4">
@@ -28228,7 +29835,7 @@
         </p:xfrm>
         <a:graphic>
           <a:graphicData uri="http://schemas.openxmlformats.org/drawingml/2006/diagram">
-            <dgm:relIds xmlns:dgm="http://schemas.openxmlformats.org/drawingml/2006/diagram" xmlns:r="http://schemas.openxmlformats.org/officeDocument/2006/relationships" r:dm="rId2" r:lo="rId3" r:qs="rId4" r:cs="rId5"/>
+            <dgm:relIds xmlns:dgm="http://schemas.openxmlformats.org/drawingml/2006/diagram" xmlns:r="http://schemas.openxmlformats.org/officeDocument/2006/relationships" r:dm="rId3" r:lo="rId4" r:qs="rId5" r:cs="rId6"/>
           </a:graphicData>
         </a:graphic>
       </p:graphicFrame>
@@ -28247,7 +29854,7 @@
           <p:nvPr/>
         </p:nvPicPr>
         <p:blipFill>
-          <a:blip r:embed="rId7">
+          <a:blip r:embed="rId8">
             <a:extLst>
               <a:ext uri="{28A0092B-C50C-407E-A947-70E740481C1C}">
                 <a14:useLocalDpi xmlns:a14="http://schemas.microsoft.com/office/drawing/2010/main" val="0"/>
@@ -28279,6 +29886,58 @@
           </a:extLst>
         </p:spPr>
       </p:pic>
+      <p:sp>
+        <p:nvSpPr>
+          <p:cNvPr id="6" name="Rectangle 5">
+            <a:extLst>
+              <a:ext uri="{FF2B5EF4-FFF2-40B4-BE49-F238E27FC236}">
+                <a16:creationId xmlns:a16="http://schemas.microsoft.com/office/drawing/2014/main" id="{2E6E4E9F-4C36-DFCA-2552-8BF6712B9F20}"/>
+              </a:ext>
+            </a:extLst>
+          </p:cNvPr>
+          <p:cNvSpPr/>
+          <p:nvPr/>
+        </p:nvSpPr>
+        <p:spPr>
+          <a:xfrm>
+            <a:off x="6988722" y="1676092"/>
+            <a:ext cx="1643063" cy="1057275"/>
+          </a:xfrm>
+          <a:prstGeom prst="rect">
+            <a:avLst/>
+          </a:prstGeom>
+          <a:noFill/>
+          <a:ln w="63500">
+            <a:solidFill>
+              <a:srgbClr val="FF0000"/>
+            </a:solidFill>
+          </a:ln>
+        </p:spPr>
+        <p:style>
+          <a:lnRef idx="2">
+            <a:schemeClr val="accent1">
+              <a:shade val="15000"/>
+            </a:schemeClr>
+          </a:lnRef>
+          <a:fillRef idx="1">
+            <a:schemeClr val="accent1"/>
+          </a:fillRef>
+          <a:effectRef idx="0">
+            <a:schemeClr val="accent1"/>
+          </a:effectRef>
+          <a:fontRef idx="minor">
+            <a:schemeClr val="lt1"/>
+          </a:fontRef>
+        </p:style>
+        <p:txBody>
+          <a:bodyPr rtlCol="0" anchor="ctr"/>
+          <a:lstStyle/>
+          <a:p>
+            <a:pPr algn="ctr"/>
+            <a:endParaRPr lang="en-AU"/>
+          </a:p>
+        </p:txBody>
+      </p:sp>
     </p:spTree>
     <p:extLst>
       <p:ext uri="{BB962C8B-B14F-4D97-AF65-F5344CB8AC3E}">
@@ -28289,10 +29948,96 @@
   <p:clrMapOvr>
     <a:masterClrMapping/>
   </p:clrMapOvr>
+  <p:timing>
+    <p:tnLst>
+      <p:par>
+        <p:cTn id="1" dur="indefinite" restart="never" nodeType="tmRoot">
+          <p:childTnLst>
+            <p:seq concurrent="1" nextAc="seek">
+              <p:cTn id="2" dur="indefinite" nodeType="mainSeq">
+                <p:childTnLst>
+                  <p:par>
+                    <p:cTn id="3" fill="hold">
+                      <p:stCondLst>
+                        <p:cond delay="indefinite"/>
+                      </p:stCondLst>
+                      <p:childTnLst>
+                        <p:par>
+                          <p:cTn id="4" fill="hold">
+                            <p:stCondLst>
+                              <p:cond delay="0"/>
+                            </p:stCondLst>
+                            <p:childTnLst>
+                              <p:par>
+                                <p:cTn id="5" presetID="10" presetClass="entr" presetSubtype="0" fill="hold" grpId="0" nodeType="clickEffect">
+                                  <p:stCondLst>
+                                    <p:cond delay="0"/>
+                                  </p:stCondLst>
+                                  <p:childTnLst>
+                                    <p:set>
+                                      <p:cBhvr>
+                                        <p:cTn id="6" dur="1" fill="hold">
+                                          <p:stCondLst>
+                                            <p:cond delay="0"/>
+                                          </p:stCondLst>
+                                        </p:cTn>
+                                        <p:tgtEl>
+                                          <p:spTgt spid="6"/>
+                                        </p:tgtEl>
+                                        <p:attrNameLst>
+                                          <p:attrName>style.visibility</p:attrName>
+                                        </p:attrNameLst>
+                                      </p:cBhvr>
+                                      <p:to>
+                                        <p:strVal val="visible"/>
+                                      </p:to>
+                                    </p:set>
+                                    <p:animEffect transition="in" filter="fade">
+                                      <p:cBhvr>
+                                        <p:cTn id="7" dur="500"/>
+                                        <p:tgtEl>
+                                          <p:spTgt spid="6"/>
+                                        </p:tgtEl>
+                                      </p:cBhvr>
+                                    </p:animEffect>
+                                  </p:childTnLst>
+                                </p:cTn>
+                              </p:par>
+                            </p:childTnLst>
+                          </p:cTn>
+                        </p:par>
+                      </p:childTnLst>
+                    </p:cTn>
+                  </p:par>
+                </p:childTnLst>
+              </p:cTn>
+              <p:prevCondLst>
+                <p:cond evt="onPrev" delay="0">
+                  <p:tgtEl>
+                    <p:sldTgt/>
+                  </p:tgtEl>
+                </p:cond>
+              </p:prevCondLst>
+              <p:nextCondLst>
+                <p:cond evt="onNext" delay="0">
+                  <p:tgtEl>
+                    <p:sldTgt/>
+                  </p:tgtEl>
+                </p:cond>
+              </p:nextCondLst>
+            </p:seq>
+          </p:childTnLst>
+        </p:cTn>
+      </p:par>
+    </p:tnLst>
+    <p:bldLst>
+      <p:bldP spid="6" grpId="0" animBg="1"/>
+    </p:bldLst>
+  </p:timing>
 </p:sld>
 </file>
 
-<file path=ppt/slides/slide3.xml><?xml version="1.0" encoding="utf-8"?>
+<file path=ppt/slides/slide2.xml><?xml version="1.0" encoding="utf-8"?>
 <p:sld xmlns:a="http://schemas.openxmlformats.org/drawingml/2006/main" xmlns:r="http://schemas.openxmlformats.org/officeDocument/2006/relationships" xmlns:p="http://schemas.openxmlformats.org/presentationml/2006/main">
   <p:cSld>
     <p:spTree>
@@ -28479,7 +30224,7 @@
           <p:nvPr/>
         </p:nvPicPr>
         <p:blipFill>
-          <a:blip r:embed="rId2">
+          <a:blip r:embed="rId3">
             <a:extLst>
               <a:ext uri="{28A0092B-C50C-407E-A947-70E740481C1C}">
                 <a14:useLocalDpi xmlns:a14="http://schemas.microsoft.com/office/drawing/2010/main" val="0"/>
@@ -28521,10 +30266,22 @@
   <p:clrMapOvr>
     <a:masterClrMapping/>
   </p:clrMapOvr>
+  <mc:AlternateContent xmlns:mc="http://schemas.openxmlformats.org/markup-compatibility/2006">
+    <mc:Choice xmlns:p14="http://schemas.microsoft.com/office/powerpoint/2010/main" Requires="p14">
+      <p:transition spd="med" p14:dur="700">
+        <p:fade/>
+      </p:transition>
+    </mc:Choice>
+    <mc:Fallback>
+      <p:transition spd="med">
+        <p:fade/>
+      </p:transition>
+    </mc:Fallback>
+  </mc:AlternateContent>
 </p:sld>
 </file>
 
-<file path=ppt/slides/slide4.xml><?xml version="1.0" encoding="utf-8"?>
+<file path=ppt/slides/slide3.xml><?xml version="1.0" encoding="utf-8"?>
 <p:sld xmlns:a="http://schemas.openxmlformats.org/drawingml/2006/main" xmlns:r="http://schemas.openxmlformats.org/officeDocument/2006/relationships" xmlns:p="http://schemas.openxmlformats.org/presentationml/2006/main">
   <p:cSld>
     <p:spTree>
@@ -28640,7 +30397,7 @@
           <p:nvPr/>
         </p:nvPicPr>
         <p:blipFill>
-          <a:blip r:embed="rId2">
+          <a:blip r:embed="rId3">
             <a:extLst>
               <a:ext uri="{28A0092B-C50C-407E-A947-70E740481C1C}">
                 <a14:useLocalDpi xmlns:a14="http://schemas.microsoft.com/office/drawing/2010/main" val="0"/>
@@ -28959,7 +30716,7 @@
             <p:nvPr/>
           </p:nvPicPr>
           <p:blipFill rotWithShape="1">
-            <a:blip r:embed="rId3">
+            <a:blip r:embed="rId4">
               <a:alphaModFix/>
             </a:blip>
             <a:srcRect/>
@@ -29199,7 +30956,7 @@
             <p:nvPr/>
           </p:nvPicPr>
           <p:blipFill rotWithShape="1">
-            <a:blip r:embed="rId4">
+            <a:blip r:embed="rId5">
               <a:alphaModFix/>
             </a:blip>
             <a:srcRect/>
@@ -29599,7 +31356,7 @@
               <p:nvPr/>
             </p:nvPicPr>
             <p:blipFill rotWithShape="1">
-              <a:blip r:embed="rId5">
+              <a:blip r:embed="rId6">
                 <a:alphaModFix/>
               </a:blip>
               <a:srcRect/>
@@ -29838,7 +31595,7 @@
             <p:nvPr/>
           </p:nvPicPr>
           <p:blipFill rotWithShape="1">
-            <a:blip r:embed="rId5">
+            <a:blip r:embed="rId6">
               <a:alphaModFix/>
             </a:blip>
             <a:srcRect/>
@@ -30294,7 +32051,7 @@
               <p:nvPr/>
             </p:nvPicPr>
             <p:blipFill rotWithShape="1">
-              <a:blip r:embed="rId6">
+              <a:blip r:embed="rId7">
                 <a:alphaModFix/>
               </a:blip>
               <a:srcRect/>
@@ -30327,7 +32084,7 @@
               <p:nvPr/>
             </p:nvPicPr>
             <p:blipFill rotWithShape="1">
-              <a:blip r:embed="rId7">
+              <a:blip r:embed="rId8">
                 <a:alphaModFix/>
               </a:blip>
               <a:srcRect/>
@@ -30495,6 +32252,580 @@
   <p:clrMapOvr>
     <a:masterClrMapping/>
   </p:clrMapOvr>
+  <mc:AlternateContent xmlns:mc="http://schemas.openxmlformats.org/markup-compatibility/2006">
+    <mc:Choice xmlns:p14="http://schemas.microsoft.com/office/powerpoint/2010/main" Requires="p14">
+      <p:transition spd="med" p14:dur="700">
+        <p:fade/>
+      </p:transition>
+    </mc:Choice>
+    <mc:Fallback>
+      <p:transition spd="med">
+        <p:fade/>
+      </p:transition>
+    </mc:Fallback>
+  </mc:AlternateContent>
+</p:sld>
+</file>
+
+<file path=ppt/slides/slide4.xml><?xml version="1.0" encoding="utf-8"?>
+<p:sld xmlns:a="http://schemas.openxmlformats.org/drawingml/2006/main" xmlns:r="http://schemas.openxmlformats.org/officeDocument/2006/relationships" xmlns:p="http://schemas.openxmlformats.org/presentationml/2006/main">
+  <p:cSld>
+    <p:spTree>
+      <p:nvGrpSpPr>
+        <p:cNvPr id="1" name="">
+          <a:extLst>
+            <a:ext uri="{FF2B5EF4-FFF2-40B4-BE49-F238E27FC236}">
+              <a16:creationId xmlns:a16="http://schemas.microsoft.com/office/drawing/2014/main" id="{9A55EA0B-8BE8-1E0D-5916-9CA61CC527AE}"/>
+            </a:ext>
+          </a:extLst>
+        </p:cNvPr>
+        <p:cNvGrpSpPr/>
+        <p:nvPr/>
+      </p:nvGrpSpPr>
+      <p:grpSpPr>
+        <a:xfrm>
+          <a:off x="0" y="0"/>
+          <a:ext cx="0" cy="0"/>
+          <a:chOff x="0" y="0"/>
+          <a:chExt cx="0" cy="0"/>
+        </a:xfrm>
+      </p:grpSpPr>
+      <p:sp>
+        <p:nvSpPr>
+          <p:cNvPr id="4" name="Rectangle 3">
+            <a:extLst>
+              <a:ext uri="{FF2B5EF4-FFF2-40B4-BE49-F238E27FC236}">
+                <a16:creationId xmlns:a16="http://schemas.microsoft.com/office/drawing/2014/main" id="{72F99842-389E-8536-CE1E-6E7D02A2C31B}"/>
+              </a:ext>
+            </a:extLst>
+          </p:cNvPr>
+          <p:cNvSpPr/>
+          <p:nvPr/>
+        </p:nvSpPr>
+        <p:spPr>
+          <a:xfrm>
+            <a:off x="8953995" y="3764478"/>
+            <a:ext cx="3238005" cy="3093522"/>
+          </a:xfrm>
+          <a:prstGeom prst="rect">
+            <a:avLst/>
+          </a:prstGeom>
+        </p:spPr>
+        <p:style>
+          <a:lnRef idx="2">
+            <a:schemeClr val="accent1">
+              <a:shade val="15000"/>
+            </a:schemeClr>
+          </a:lnRef>
+          <a:fillRef idx="1">
+            <a:schemeClr val="accent1"/>
+          </a:fillRef>
+          <a:effectRef idx="0">
+            <a:schemeClr val="accent1"/>
+          </a:effectRef>
+          <a:fontRef idx="minor">
+            <a:schemeClr val="lt1"/>
+          </a:fontRef>
+        </p:style>
+        <p:txBody>
+          <a:bodyPr rtlCol="0" anchor="ctr"/>
+          <a:lstStyle/>
+          <a:p>
+            <a:pPr algn="ctr"/>
+            <a:endParaRPr lang="en-AU"/>
+          </a:p>
+        </p:txBody>
+      </p:sp>
+      <p:sp>
+        <p:nvSpPr>
+          <p:cNvPr id="2" name="Title 1">
+            <a:extLst>
+              <a:ext uri="{FF2B5EF4-FFF2-40B4-BE49-F238E27FC236}">
+                <a16:creationId xmlns:a16="http://schemas.microsoft.com/office/drawing/2014/main" id="{CC605F28-9CE4-DD86-589D-FAC5B9D0F237}"/>
+              </a:ext>
+            </a:extLst>
+          </p:cNvPr>
+          <p:cNvSpPr>
+            <a:spLocks noGrp="1"/>
+          </p:cNvSpPr>
+          <p:nvPr>
+            <p:ph type="title"/>
+          </p:nvPr>
+        </p:nvSpPr>
+        <p:spPr/>
+        <p:txBody>
+          <a:bodyPr/>
+          <a:lstStyle/>
+          <a:p>
+            <a:r>
+              <a:rPr lang="en-AU" dirty="0"/>
+              <a:t>Durable Agents</a:t>
+            </a:r>
+          </a:p>
+        </p:txBody>
+      </p:sp>
+      <p:pic>
+        <p:nvPicPr>
+          <p:cNvPr id="5" name="Picture 2" descr="Home - Dapr Agents">
+            <a:extLst>
+              <a:ext uri="{FF2B5EF4-FFF2-40B4-BE49-F238E27FC236}">
+                <a16:creationId xmlns:a16="http://schemas.microsoft.com/office/drawing/2014/main" id="{96BD182F-4C16-9259-9D18-3DA085D78341}"/>
+              </a:ext>
+            </a:extLst>
+          </p:cNvPr>
+          <p:cNvPicPr>
+            <a:picLocks noChangeAspect="1" noChangeArrowheads="1"/>
+          </p:cNvPicPr>
+          <p:nvPr/>
+        </p:nvPicPr>
+        <p:blipFill>
+          <a:blip r:embed="rId3">
+            <a:extLst>
+              <a:ext uri="{28A0092B-C50C-407E-A947-70E740481C1C}">
+                <a14:useLocalDpi xmlns:a14="http://schemas.microsoft.com/office/drawing/2010/main" val="0"/>
+              </a:ext>
+            </a:extLst>
+          </a:blip>
+          <a:srcRect/>
+          <a:stretch>
+            <a:fillRect/>
+          </a:stretch>
+        </p:blipFill>
+        <p:spPr bwMode="auto">
+          <a:xfrm>
+            <a:off x="8834684" y="145348"/>
+            <a:ext cx="3476625" cy="3476625"/>
+          </a:xfrm>
+          <a:prstGeom prst="rect">
+            <a:avLst/>
+          </a:prstGeom>
+          <a:noFill/>
+          <a:extLst>
+            <a:ext uri="{909E8E84-426E-40DD-AFC4-6F175D3DCCD1}">
+              <a14:hiddenFill xmlns:a14="http://schemas.microsoft.com/office/drawing/2010/main">
+                <a:solidFill>
+                  <a:srgbClr val="FFFFFF"/>
+                </a:solidFill>
+              </a14:hiddenFill>
+            </a:ext>
+          </a:extLst>
+        </p:spPr>
+      </p:pic>
+      <p:pic>
+        <p:nvPicPr>
+          <p:cNvPr id="48" name="Picture 47">
+            <a:extLst>
+              <a:ext uri="{FF2B5EF4-FFF2-40B4-BE49-F238E27FC236}">
+                <a16:creationId xmlns:a16="http://schemas.microsoft.com/office/drawing/2014/main" id="{D3C9277F-3458-5F0C-D598-9EDE48B4AD28}"/>
+              </a:ext>
+            </a:extLst>
+          </p:cNvPr>
+          <p:cNvPicPr>
+            <a:picLocks noChangeAspect="1"/>
+          </p:cNvPicPr>
+          <p:nvPr/>
+        </p:nvPicPr>
+        <p:blipFill>
+          <a:blip r:embed="rId4"/>
+          <a:stretch>
+            <a:fillRect/>
+          </a:stretch>
+        </p:blipFill>
+        <p:spPr>
+          <a:xfrm>
+            <a:off x="1913918" y="1865376"/>
+            <a:ext cx="6094984" cy="4640151"/>
+          </a:xfrm>
+          <a:prstGeom prst="rect">
+            <a:avLst/>
+          </a:prstGeom>
+        </p:spPr>
+      </p:pic>
+    </p:spTree>
+    <p:extLst>
+      <p:ext uri="{BB962C8B-B14F-4D97-AF65-F5344CB8AC3E}">
+        <p14:creationId xmlns:p14="http://schemas.microsoft.com/office/powerpoint/2010/main" val="4021364256"/>
+      </p:ext>
+    </p:extLst>
+  </p:cSld>
+  <p:clrMapOvr>
+    <a:masterClrMapping/>
+  </p:clrMapOvr>
+  <mc:AlternateContent xmlns:mc="http://schemas.openxmlformats.org/markup-compatibility/2006">
+    <mc:Choice xmlns:p14="http://schemas.microsoft.com/office/powerpoint/2010/main" Requires="p14">
+      <p:transition spd="med" p14:dur="700">
+        <p:fade/>
+      </p:transition>
+    </mc:Choice>
+    <mc:Fallback>
+      <p:transition spd="med">
+        <p:fade/>
+      </p:transition>
+    </mc:Fallback>
+  </mc:AlternateContent>
+</p:sld>
+</file>
+
+<file path=ppt/slides/slide5.xml><?xml version="1.0" encoding="utf-8"?>
+<p:sld xmlns:a="http://schemas.openxmlformats.org/drawingml/2006/main" xmlns:r="http://schemas.openxmlformats.org/officeDocument/2006/relationships" xmlns:p="http://schemas.openxmlformats.org/presentationml/2006/main">
+  <p:cSld>
+    <p:spTree>
+      <p:nvGrpSpPr>
+        <p:cNvPr id="1" name="">
+          <a:extLst>
+            <a:ext uri="{FF2B5EF4-FFF2-40B4-BE49-F238E27FC236}">
+              <a16:creationId xmlns:a16="http://schemas.microsoft.com/office/drawing/2014/main" id="{F01697C7-870F-D6FD-3ED2-F6BD69D8E80C}"/>
+            </a:ext>
+          </a:extLst>
+        </p:cNvPr>
+        <p:cNvGrpSpPr/>
+        <p:nvPr/>
+      </p:nvGrpSpPr>
+      <p:grpSpPr>
+        <a:xfrm>
+          <a:off x="0" y="0"/>
+          <a:ext cx="0" cy="0"/>
+          <a:chOff x="0" y="0"/>
+          <a:chExt cx="0" cy="0"/>
+        </a:xfrm>
+      </p:grpSpPr>
+      <p:sp>
+        <p:nvSpPr>
+          <p:cNvPr id="4" name="Rectangle 3">
+            <a:extLst>
+              <a:ext uri="{FF2B5EF4-FFF2-40B4-BE49-F238E27FC236}">
+                <a16:creationId xmlns:a16="http://schemas.microsoft.com/office/drawing/2014/main" id="{54637FE5-7866-383A-6AAA-C823AD8E7777}"/>
+              </a:ext>
+            </a:extLst>
+          </p:cNvPr>
+          <p:cNvSpPr/>
+          <p:nvPr/>
+        </p:nvSpPr>
+        <p:spPr>
+          <a:xfrm>
+            <a:off x="8953995" y="3764478"/>
+            <a:ext cx="3238005" cy="3093522"/>
+          </a:xfrm>
+          <a:prstGeom prst="rect">
+            <a:avLst/>
+          </a:prstGeom>
+        </p:spPr>
+        <p:style>
+          <a:lnRef idx="2">
+            <a:schemeClr val="accent1">
+              <a:shade val="15000"/>
+            </a:schemeClr>
+          </a:lnRef>
+          <a:fillRef idx="1">
+            <a:schemeClr val="accent1"/>
+          </a:fillRef>
+          <a:effectRef idx="0">
+            <a:schemeClr val="accent1"/>
+          </a:effectRef>
+          <a:fontRef idx="minor">
+            <a:schemeClr val="lt1"/>
+          </a:fontRef>
+        </p:style>
+        <p:txBody>
+          <a:bodyPr rtlCol="0" anchor="ctr"/>
+          <a:lstStyle/>
+          <a:p>
+            <a:pPr algn="ctr"/>
+            <a:endParaRPr lang="en-AU"/>
+          </a:p>
+        </p:txBody>
+      </p:sp>
+      <p:graphicFrame>
+        <p:nvGraphicFramePr>
+          <p:cNvPr id="6" name="Content Placeholder 5">
+            <a:extLst>
+              <a:ext uri="{FF2B5EF4-FFF2-40B4-BE49-F238E27FC236}">
+                <a16:creationId xmlns:a16="http://schemas.microsoft.com/office/drawing/2014/main" id="{1D7CB91C-2FCD-D914-D526-FDA50F7DDDE3}"/>
+              </a:ext>
+            </a:extLst>
+          </p:cNvPr>
+          <p:cNvGraphicFramePr>
+            <a:graphicFrameLocks noGrp="1"/>
+          </p:cNvGraphicFramePr>
+          <p:nvPr>
+            <p:ph sz="quarter" idx="13"/>
+            <p:extLst>
+              <p:ext uri="{D42A27DB-BD31-4B8C-83A1-F6EECF244321}">
+                <p14:modId xmlns:p14="http://schemas.microsoft.com/office/powerpoint/2010/main" val="2620610085"/>
+              </p:ext>
+            </p:extLst>
+          </p:nvPr>
+        </p:nvGraphicFramePr>
+        <p:xfrm>
+          <a:off x="1087439" y="2651125"/>
+          <a:ext cx="7747246" cy="3700514"/>
+        </p:xfrm>
+        <a:graphic>
+          <a:graphicData uri="http://schemas.openxmlformats.org/drawingml/2006/diagram">
+            <dgm:relIds xmlns:dgm="http://schemas.openxmlformats.org/drawingml/2006/diagram" xmlns:r="http://schemas.openxmlformats.org/officeDocument/2006/relationships" r:dm="rId3" r:lo="rId4" r:qs="rId5" r:cs="rId6"/>
+          </a:graphicData>
+        </a:graphic>
+      </p:graphicFrame>
+      <p:sp>
+        <p:nvSpPr>
+          <p:cNvPr id="2" name="Title 1">
+            <a:extLst>
+              <a:ext uri="{FF2B5EF4-FFF2-40B4-BE49-F238E27FC236}">
+                <a16:creationId xmlns:a16="http://schemas.microsoft.com/office/drawing/2014/main" id="{F774F3CB-3298-71BD-557C-E68FDB3501B3}"/>
+              </a:ext>
+            </a:extLst>
+          </p:cNvPr>
+          <p:cNvSpPr>
+            <a:spLocks noGrp="1"/>
+          </p:cNvSpPr>
+          <p:nvPr>
+            <p:ph type="title"/>
+          </p:nvPr>
+        </p:nvSpPr>
+        <p:spPr/>
+        <p:txBody>
+          <a:bodyPr/>
+          <a:lstStyle/>
+          <a:p>
+            <a:r>
+              <a:rPr lang="en-AU" dirty="0"/>
+              <a:t>Agent Collaboration in </a:t>
+            </a:r>
+            <a:br>
+              <a:rPr lang="en-AU" dirty="0"/>
+            </a:br>
+            <a:r>
+              <a:rPr lang="en-AU" dirty="0"/>
+              <a:t>Workflows</a:t>
+            </a:r>
+          </a:p>
+        </p:txBody>
+      </p:sp>
+      <p:pic>
+        <p:nvPicPr>
+          <p:cNvPr id="5" name="Picture 2" descr="Home - Dapr Agents">
+            <a:extLst>
+              <a:ext uri="{FF2B5EF4-FFF2-40B4-BE49-F238E27FC236}">
+                <a16:creationId xmlns:a16="http://schemas.microsoft.com/office/drawing/2014/main" id="{516C96A2-DBC1-5F9E-4004-D3DEB85E390A}"/>
+              </a:ext>
+            </a:extLst>
+          </p:cNvPr>
+          <p:cNvPicPr>
+            <a:picLocks noChangeAspect="1" noChangeArrowheads="1"/>
+          </p:cNvPicPr>
+          <p:nvPr/>
+        </p:nvPicPr>
+        <p:blipFill>
+          <a:blip r:embed="rId8">
+            <a:extLst>
+              <a:ext uri="{28A0092B-C50C-407E-A947-70E740481C1C}">
+                <a14:useLocalDpi xmlns:a14="http://schemas.microsoft.com/office/drawing/2010/main" val="0"/>
+              </a:ext>
+            </a:extLst>
+          </a:blip>
+          <a:srcRect/>
+          <a:stretch>
+            <a:fillRect/>
+          </a:stretch>
+        </p:blipFill>
+        <p:spPr bwMode="auto">
+          <a:xfrm>
+            <a:off x="8834684" y="145348"/>
+            <a:ext cx="3476625" cy="3476625"/>
+          </a:xfrm>
+          <a:prstGeom prst="rect">
+            <a:avLst/>
+          </a:prstGeom>
+          <a:noFill/>
+          <a:extLst>
+            <a:ext uri="{909E8E84-426E-40DD-AFC4-6F175D3DCCD1}">
+              <a14:hiddenFill xmlns:a14="http://schemas.microsoft.com/office/drawing/2010/main">
+                <a:solidFill>
+                  <a:srgbClr val="FFFFFF"/>
+                </a:solidFill>
+              </a14:hiddenFill>
+            </a:ext>
+          </a:extLst>
+        </p:spPr>
+      </p:pic>
+      <p:sp>
+        <p:nvSpPr>
+          <p:cNvPr id="3" name="Rectangle 2">
+            <a:extLst>
+              <a:ext uri="{FF2B5EF4-FFF2-40B4-BE49-F238E27FC236}">
+                <a16:creationId xmlns:a16="http://schemas.microsoft.com/office/drawing/2014/main" id="{2F4E2747-A196-039C-5AC5-0B156909AE0B}"/>
+              </a:ext>
+            </a:extLst>
+          </p:cNvPr>
+          <p:cNvSpPr/>
+          <p:nvPr/>
+        </p:nvSpPr>
+        <p:spPr>
+          <a:xfrm>
+            <a:off x="993243" y="2564698"/>
+            <a:ext cx="2651831" cy="2458239"/>
+          </a:xfrm>
+          <a:prstGeom prst="rect">
+            <a:avLst/>
+          </a:prstGeom>
+          <a:noFill/>
+          <a:ln w="63500">
+            <a:solidFill>
+              <a:srgbClr val="FF0000"/>
+            </a:solidFill>
+          </a:ln>
+        </p:spPr>
+        <p:style>
+          <a:lnRef idx="2">
+            <a:schemeClr val="accent1">
+              <a:shade val="15000"/>
+            </a:schemeClr>
+          </a:lnRef>
+          <a:fillRef idx="1">
+            <a:schemeClr val="accent1"/>
+          </a:fillRef>
+          <a:effectRef idx="0">
+            <a:schemeClr val="accent1"/>
+          </a:effectRef>
+          <a:fontRef idx="minor">
+            <a:schemeClr val="lt1"/>
+          </a:fontRef>
+        </p:style>
+        <p:txBody>
+          <a:bodyPr rtlCol="0" anchor="ctr"/>
+          <a:lstStyle/>
+          <a:p>
+            <a:pPr algn="ctr"/>
+            <a:endParaRPr lang="en-AU"/>
+          </a:p>
+        </p:txBody>
+      </p:sp>
+      <p:sp>
+        <p:nvSpPr>
+          <p:cNvPr id="7" name="Rectangle 6">
+            <a:extLst>
+              <a:ext uri="{FF2B5EF4-FFF2-40B4-BE49-F238E27FC236}">
+                <a16:creationId xmlns:a16="http://schemas.microsoft.com/office/drawing/2014/main" id="{6C024FD0-4FA7-925C-16B4-A6120039B718}"/>
+              </a:ext>
+            </a:extLst>
+          </p:cNvPr>
+          <p:cNvSpPr/>
+          <p:nvPr/>
+        </p:nvSpPr>
+        <p:spPr>
+          <a:xfrm>
+            <a:off x="3620022" y="2564698"/>
+            <a:ext cx="2651831" cy="2458239"/>
+          </a:xfrm>
+          <a:prstGeom prst="rect">
+            <a:avLst/>
+          </a:prstGeom>
+          <a:noFill/>
+          <a:ln w="63500">
+            <a:solidFill>
+              <a:srgbClr val="FF0000"/>
+            </a:solidFill>
+          </a:ln>
+        </p:spPr>
+        <p:style>
+          <a:lnRef idx="2">
+            <a:schemeClr val="accent1">
+              <a:shade val="15000"/>
+            </a:schemeClr>
+          </a:lnRef>
+          <a:fillRef idx="1">
+            <a:schemeClr val="accent1"/>
+          </a:fillRef>
+          <a:effectRef idx="0">
+            <a:schemeClr val="accent1"/>
+          </a:effectRef>
+          <a:fontRef idx="minor">
+            <a:schemeClr val="lt1"/>
+          </a:fontRef>
+        </p:style>
+        <p:txBody>
+          <a:bodyPr rtlCol="0" anchor="ctr"/>
+          <a:lstStyle/>
+          <a:p>
+            <a:pPr algn="ctr"/>
+            <a:endParaRPr lang="en-AU"/>
+          </a:p>
+        </p:txBody>
+      </p:sp>
+      <p:sp>
+        <p:nvSpPr>
+          <p:cNvPr id="8" name="Rectangle 7">
+            <a:extLst>
+              <a:ext uri="{FF2B5EF4-FFF2-40B4-BE49-F238E27FC236}">
+                <a16:creationId xmlns:a16="http://schemas.microsoft.com/office/drawing/2014/main" id="{B26CEBA1-5904-1289-B0DA-28FD8CCB1491}"/>
+              </a:ext>
+            </a:extLst>
+          </p:cNvPr>
+          <p:cNvSpPr/>
+          <p:nvPr/>
+        </p:nvSpPr>
+        <p:spPr>
+          <a:xfrm>
+            <a:off x="6277051" y="2564697"/>
+            <a:ext cx="2621582" cy="2458239"/>
+          </a:xfrm>
+          <a:prstGeom prst="rect">
+            <a:avLst/>
+          </a:prstGeom>
+          <a:noFill/>
+          <a:ln w="63500">
+            <a:solidFill>
+              <a:srgbClr val="FF0000"/>
+            </a:solidFill>
+          </a:ln>
+        </p:spPr>
+        <p:style>
+          <a:lnRef idx="2">
+            <a:schemeClr val="accent1">
+              <a:shade val="15000"/>
+            </a:schemeClr>
+          </a:lnRef>
+          <a:fillRef idx="1">
+            <a:schemeClr val="accent1"/>
+          </a:fillRef>
+          <a:effectRef idx="0">
+            <a:schemeClr val="accent1"/>
+          </a:effectRef>
+          <a:fontRef idx="minor">
+            <a:schemeClr val="lt1"/>
+          </a:fontRef>
+        </p:style>
+        <p:txBody>
+          <a:bodyPr rtlCol="0" anchor="ctr"/>
+          <a:lstStyle/>
+          <a:p>
+            <a:pPr algn="ctr"/>
+            <a:endParaRPr lang="en-AU"/>
+          </a:p>
+        </p:txBody>
+      </p:sp>
+    </p:spTree>
+    <p:extLst>
+      <p:ext uri="{BB962C8B-B14F-4D97-AF65-F5344CB8AC3E}">
+        <p14:creationId xmlns:p14="http://schemas.microsoft.com/office/powerpoint/2010/main" val="3227880863"/>
+      </p:ext>
+    </p:extLst>
+  </p:cSld>
+  <p:clrMapOvr>
+    <a:masterClrMapping/>
+  </p:clrMapOvr>
+  <mc:AlternateContent xmlns:mc="http://schemas.openxmlformats.org/markup-compatibility/2006">
+    <mc:Choice xmlns:p14="http://schemas.microsoft.com/office/powerpoint/2010/main" Requires="p14">
+      <p:transition spd="med" p14:dur="700">
+        <p:fade/>
+      </p:transition>
+    </mc:Choice>
+    <mc:Fallback>
+      <p:transition spd="med">
+        <p:fade/>
+      </p:transition>
+    </mc:Fallback>
+  </mc:AlternateContent>
   <p:timing>
     <p:tnLst>
       <p:par>
@@ -30516,7 +32847,7 @@
                             </p:stCondLst>
                             <p:childTnLst>
                               <p:par>
-                                <p:cTn id="5" presetID="1" presetClass="entr" presetSubtype="0" fill="hold" nodeType="clickEffect">
+                                <p:cTn id="5" presetID="10" presetClass="entr" presetSubtype="0" fill="hold" grpId="0" nodeType="clickEffect">
                                   <p:stCondLst>
                                     <p:cond delay="0"/>
                                   </p:stCondLst>
@@ -30529,7 +32860,7 @@
                                           </p:stCondLst>
                                         </p:cTn>
                                         <p:tgtEl>
-                                          <p:spTgt spid="49"/>
+                                          <p:spTgt spid="3"/>
                                         </p:tgtEl>
                                         <p:attrNameLst>
                                           <p:attrName>style.visibility</p:attrName>
@@ -30537,6 +32868,67 @@
                                       </p:cBhvr>
                                       <p:to>
                                         <p:strVal val="visible"/>
+                                      </p:to>
+                                    </p:set>
+                                    <p:animEffect transition="in" filter="fade">
+                                      <p:cBhvr>
+                                        <p:cTn id="7" dur="500"/>
+                                        <p:tgtEl>
+                                          <p:spTgt spid="3"/>
+                                        </p:tgtEl>
+                                      </p:cBhvr>
+                                    </p:animEffect>
+                                  </p:childTnLst>
+                                </p:cTn>
+                              </p:par>
+                            </p:childTnLst>
+                          </p:cTn>
+                        </p:par>
+                      </p:childTnLst>
+                    </p:cTn>
+                  </p:par>
+                  <p:par>
+                    <p:cTn id="8" fill="hold">
+                      <p:stCondLst>
+                        <p:cond delay="indefinite"/>
+                      </p:stCondLst>
+                      <p:childTnLst>
+                        <p:par>
+                          <p:cTn id="9" fill="hold">
+                            <p:stCondLst>
+                              <p:cond delay="0"/>
+                            </p:stCondLst>
+                            <p:childTnLst>
+                              <p:par>
+                                <p:cTn id="10" presetID="10" presetClass="exit" presetSubtype="0" fill="hold" grpId="1" nodeType="clickEffect">
+                                  <p:stCondLst>
+                                    <p:cond delay="0"/>
+                                  </p:stCondLst>
+                                  <p:childTnLst>
+                                    <p:animEffect transition="out" filter="fade">
+                                      <p:cBhvr>
+                                        <p:cTn id="11" dur="500"/>
+                                        <p:tgtEl>
+                                          <p:spTgt spid="3"/>
+                                        </p:tgtEl>
+                                      </p:cBhvr>
+                                    </p:animEffect>
+                                    <p:set>
+                                      <p:cBhvr>
+                                        <p:cTn id="12" dur="1" fill="hold">
+                                          <p:stCondLst>
+                                            <p:cond delay="499"/>
+                                          </p:stCondLst>
+                                        </p:cTn>
+                                        <p:tgtEl>
+                                          <p:spTgt spid="3"/>
+                                        </p:tgtEl>
+                                        <p:attrNameLst>
+                                          <p:attrName>style.visibility</p:attrName>
+                                        </p:attrNameLst>
+                                      </p:cBhvr>
+                                      <p:to>
+                                        <p:strVal val="hidden"/>
                                       </p:to>
                                     </p:set>
                                   </p:childTnLst>
@@ -30549,32 +32941,32 @@
                     </p:cTn>
                   </p:par>
                   <p:par>
-                    <p:cTn id="7" fill="hold">
+                    <p:cTn id="13" fill="hold">
                       <p:stCondLst>
                         <p:cond delay="indefinite"/>
                       </p:stCondLst>
                       <p:childTnLst>
                         <p:par>
-                          <p:cTn id="8" fill="hold">
+                          <p:cTn id="14" fill="hold">
                             <p:stCondLst>
                               <p:cond delay="0"/>
                             </p:stCondLst>
                             <p:childTnLst>
                               <p:par>
-                                <p:cTn id="9" presetID="1" presetClass="entr" presetSubtype="0" fill="hold" nodeType="clickEffect">
+                                <p:cTn id="15" presetID="10" presetClass="entr" presetSubtype="0" fill="hold" grpId="0" nodeType="clickEffect">
                                   <p:stCondLst>
                                     <p:cond delay="0"/>
                                   </p:stCondLst>
                                   <p:childTnLst>
                                     <p:set>
                                       <p:cBhvr>
-                                        <p:cTn id="10" dur="1" fill="hold">
+                                        <p:cTn id="16" dur="1" fill="hold">
                                           <p:stCondLst>
                                             <p:cond delay="0"/>
                                           </p:stCondLst>
                                         </p:cTn>
                                         <p:tgtEl>
-                                          <p:spTgt spid="55"/>
+                                          <p:spTgt spid="7"/>
                                         </p:tgtEl>
                                         <p:attrNameLst>
                                           <p:attrName>style.visibility</p:attrName>
@@ -30582,6 +32974,67 @@
                                       </p:cBhvr>
                                       <p:to>
                                         <p:strVal val="visible"/>
+                                      </p:to>
+                                    </p:set>
+                                    <p:animEffect transition="in" filter="fade">
+                                      <p:cBhvr>
+                                        <p:cTn id="17" dur="500"/>
+                                        <p:tgtEl>
+                                          <p:spTgt spid="7"/>
+                                        </p:tgtEl>
+                                      </p:cBhvr>
+                                    </p:animEffect>
+                                  </p:childTnLst>
+                                </p:cTn>
+                              </p:par>
+                            </p:childTnLst>
+                          </p:cTn>
+                        </p:par>
+                      </p:childTnLst>
+                    </p:cTn>
+                  </p:par>
+                  <p:par>
+                    <p:cTn id="18" fill="hold">
+                      <p:stCondLst>
+                        <p:cond delay="indefinite"/>
+                      </p:stCondLst>
+                      <p:childTnLst>
+                        <p:par>
+                          <p:cTn id="19" fill="hold">
+                            <p:stCondLst>
+                              <p:cond delay="0"/>
+                            </p:stCondLst>
+                            <p:childTnLst>
+                              <p:par>
+                                <p:cTn id="20" presetID="10" presetClass="exit" presetSubtype="0" fill="hold" grpId="1" nodeType="clickEffect">
+                                  <p:stCondLst>
+                                    <p:cond delay="0"/>
+                                  </p:stCondLst>
+                                  <p:childTnLst>
+                                    <p:animEffect transition="out" filter="fade">
+                                      <p:cBhvr>
+                                        <p:cTn id="21" dur="500"/>
+                                        <p:tgtEl>
+                                          <p:spTgt spid="7"/>
+                                        </p:tgtEl>
+                                      </p:cBhvr>
+                                    </p:animEffect>
+                                    <p:set>
+                                      <p:cBhvr>
+                                        <p:cTn id="22" dur="1" fill="hold">
+                                          <p:stCondLst>
+                                            <p:cond delay="499"/>
+                                          </p:stCondLst>
+                                        </p:cTn>
+                                        <p:tgtEl>
+                                          <p:spTgt spid="7"/>
+                                        </p:tgtEl>
+                                        <p:attrNameLst>
+                                          <p:attrName>style.visibility</p:attrName>
+                                        </p:attrNameLst>
+                                      </p:cBhvr>
+                                      <p:to>
+                                        <p:strVal val="hidden"/>
                                       </p:to>
                                     </p:set>
                                   </p:childTnLst>
@@ -30594,32 +33047,32 @@
                     </p:cTn>
                   </p:par>
                   <p:par>
-                    <p:cTn id="11" fill="hold">
+                    <p:cTn id="23" fill="hold">
                       <p:stCondLst>
                         <p:cond delay="indefinite"/>
                       </p:stCondLst>
                       <p:childTnLst>
                         <p:par>
-                          <p:cTn id="12" fill="hold">
+                          <p:cTn id="24" fill="hold">
                             <p:stCondLst>
                               <p:cond delay="0"/>
                             </p:stCondLst>
                             <p:childTnLst>
                               <p:par>
-                                <p:cTn id="13" presetID="1" presetClass="entr" presetSubtype="0" fill="hold" nodeType="clickEffect">
+                                <p:cTn id="25" presetID="10" presetClass="entr" presetSubtype="0" fill="hold" grpId="0" nodeType="clickEffect">
                                   <p:stCondLst>
                                     <p:cond delay="0"/>
                                   </p:stCondLst>
                                   <p:childTnLst>
                                     <p:set>
                                       <p:cBhvr>
-                                        <p:cTn id="14" dur="1" fill="hold">
+                                        <p:cTn id="26" dur="1" fill="hold">
                                           <p:stCondLst>
                                             <p:cond delay="0"/>
                                           </p:stCondLst>
                                         </p:cTn>
                                         <p:tgtEl>
-                                          <p:spTgt spid="74"/>
+                                          <p:spTgt spid="8"/>
                                         </p:tgtEl>
                                         <p:attrNameLst>
                                           <p:attrName>style.visibility</p:attrName>
@@ -30629,6 +33082,14 @@
                                         <p:strVal val="visible"/>
                                       </p:to>
                                     </p:set>
+                                    <p:animEffect transition="in" filter="fade">
+                                      <p:cBhvr>
+                                        <p:cTn id="27" dur="500"/>
+                                        <p:tgtEl>
+                                          <p:spTgt spid="8"/>
+                                        </p:tgtEl>
+                                      </p:cBhvr>
+                                    </p:animEffect>
                                   </p:childTnLst>
                                 </p:cTn>
                               </p:par>
@@ -30639,84 +33100,47 @@
                     </p:cTn>
                   </p:par>
                   <p:par>
-                    <p:cTn id="15" fill="hold">
+                    <p:cTn id="28" fill="hold">
                       <p:stCondLst>
                         <p:cond delay="indefinite"/>
                       </p:stCondLst>
                       <p:childTnLst>
                         <p:par>
-                          <p:cTn id="16" fill="hold">
+                          <p:cTn id="29" fill="hold">
                             <p:stCondLst>
                               <p:cond delay="0"/>
                             </p:stCondLst>
                             <p:childTnLst>
                               <p:par>
-                                <p:cTn id="17" presetID="1" presetClass="entr" presetSubtype="0" fill="hold" nodeType="clickEffect">
+                                <p:cTn id="30" presetID="10" presetClass="exit" presetSubtype="0" fill="hold" grpId="1" nodeType="clickEffect">
                                   <p:stCondLst>
                                     <p:cond delay="0"/>
                                   </p:stCondLst>
                                   <p:childTnLst>
+                                    <p:animEffect transition="out" filter="fade">
+                                      <p:cBhvr>
+                                        <p:cTn id="31" dur="500"/>
+                                        <p:tgtEl>
+                                          <p:spTgt spid="8"/>
+                                        </p:tgtEl>
+                                      </p:cBhvr>
+                                    </p:animEffect>
                                     <p:set>
                                       <p:cBhvr>
-                                        <p:cTn id="18" dur="1" fill="hold">
+                                        <p:cTn id="32" dur="1" fill="hold">
                                           <p:stCondLst>
-                                            <p:cond delay="0"/>
+                                            <p:cond delay="499"/>
                                           </p:stCondLst>
                                         </p:cTn>
                                         <p:tgtEl>
-                                          <p:spTgt spid="61"/>
+                                          <p:spTgt spid="8"/>
                                         </p:tgtEl>
                                         <p:attrNameLst>
                                           <p:attrName>style.visibility</p:attrName>
                                         </p:attrNameLst>
                                       </p:cBhvr>
                                       <p:to>
-                                        <p:strVal val="visible"/>
-                                      </p:to>
-                                    </p:set>
-                                  </p:childTnLst>
-                                </p:cTn>
-                              </p:par>
-                            </p:childTnLst>
-                          </p:cTn>
-                        </p:par>
-                      </p:childTnLst>
-                    </p:cTn>
-                  </p:par>
-                  <p:par>
-                    <p:cTn id="19" fill="hold">
-                      <p:stCondLst>
-                        <p:cond delay="indefinite"/>
-                      </p:stCondLst>
-                      <p:childTnLst>
-                        <p:par>
-                          <p:cTn id="20" fill="hold">
-                            <p:stCondLst>
-                              <p:cond delay="0"/>
-                            </p:stCondLst>
-                            <p:childTnLst>
-                              <p:par>
-                                <p:cTn id="21" presetID="1" presetClass="entr" presetSubtype="0" fill="hold" nodeType="clickEffect">
-                                  <p:stCondLst>
-                                    <p:cond delay="0"/>
-                                  </p:stCondLst>
-                                  <p:childTnLst>
-                                    <p:set>
-                                      <p:cBhvr>
-                                        <p:cTn id="22" dur="1" fill="hold">
-                                          <p:stCondLst>
-                                            <p:cond delay="0"/>
-                                          </p:stCondLst>
-                                        </p:cTn>
-                                        <p:tgtEl>
-                                          <p:spTgt spid="46"/>
-                                        </p:tgtEl>
-                                        <p:attrNameLst>
-                                          <p:attrName>style.visibility</p:attrName>
-                                        </p:attrNameLst>
-                                      </p:cBhvr>
-                                      <p:to>
-                                        <p:strVal val="visible"/>
+                                        <p:strVal val="hidden"/>
                                       </p:to>
                                     </p:set>
                                   </p:childTnLst>
@@ -30749,11 +33173,19 @@
         </p:cTn>
       </p:par>
     </p:tnLst>
+    <p:bldLst>
+      <p:bldP spid="3" grpId="0" animBg="1"/>
+      <p:bldP spid="3" grpId="1" animBg="1"/>
+      <p:bldP spid="7" grpId="0" animBg="1"/>
+      <p:bldP spid="7" grpId="1" animBg="1"/>
+      <p:bldP spid="8" grpId="0" animBg="1"/>
+      <p:bldP spid="8" grpId="1" animBg="1"/>
+    </p:bldLst>
   </p:timing>
 </p:sld>
 </file>
 
-<file path=ppt/slides/slide5.xml><?xml version="1.0" encoding="utf-8"?>
+<file path=ppt/slides/slide6.xml><?xml version="1.0" encoding="utf-8"?>
 <p:sld xmlns:a="http://schemas.openxmlformats.org/drawingml/2006/main" xmlns:r="http://schemas.openxmlformats.org/officeDocument/2006/relationships" xmlns:p="http://schemas.openxmlformats.org/presentationml/2006/main">
   <p:cSld>
     <p:spTree>
@@ -30761,7 +33193,7 @@
         <p:cNvPr id="1" name="">
           <a:extLst>
             <a:ext uri="{FF2B5EF4-FFF2-40B4-BE49-F238E27FC236}">
-              <a16:creationId xmlns:a16="http://schemas.microsoft.com/office/drawing/2014/main" id="{9A55EA0B-8BE8-1E0D-5916-9CA61CC527AE}"/>
+              <a16:creationId xmlns:a16="http://schemas.microsoft.com/office/drawing/2014/main" id="{E272230B-A744-A346-ABF8-7FCCFE194F3D}"/>
             </a:ext>
           </a:extLst>
         </p:cNvPr>
@@ -30781,7 +33213,7 @@
           <p:cNvPr id="4" name="Rectangle 3">
             <a:extLst>
               <a:ext uri="{FF2B5EF4-FFF2-40B4-BE49-F238E27FC236}">
-                <a16:creationId xmlns:a16="http://schemas.microsoft.com/office/drawing/2014/main" id="{72F99842-389E-8536-CE1E-6E7D02A2C31B}"/>
+                <a16:creationId xmlns:a16="http://schemas.microsoft.com/office/drawing/2014/main" id="{59F687C1-B9FD-82F1-2450-7861349201A9}"/>
               </a:ext>
             </a:extLst>
           </p:cNvPr>
@@ -30824,28 +33256,75 @@
       </p:sp>
       <p:sp>
         <p:nvSpPr>
-          <p:cNvPr id="2" name="Title 1">
-            <a:extLst>
-              <a:ext uri="{FF2B5EF4-FFF2-40B4-BE49-F238E27FC236}">
-                <a16:creationId xmlns:a16="http://schemas.microsoft.com/office/drawing/2014/main" id="{CC605F28-9CE4-DD86-589D-FAC5B9D0F237}"/>
-              </a:ext>
-            </a:extLst>
-          </p:cNvPr>
-          <p:cNvSpPr>
-            <a:spLocks noGrp="1"/>
-          </p:cNvSpPr>
-          <p:nvPr>
-            <p:ph type="title"/>
-          </p:nvPr>
-        </p:nvSpPr>
-        <p:spPr/>
+          <p:cNvPr id="3" name="Content Placeholder 2">
+            <a:extLst>
+              <a:ext uri="{FF2B5EF4-FFF2-40B4-BE49-F238E27FC236}">
+                <a16:creationId xmlns:a16="http://schemas.microsoft.com/office/drawing/2014/main" id="{9877D093-0D59-E79B-9751-EFFD966277E8}"/>
+              </a:ext>
+            </a:extLst>
+          </p:cNvPr>
+          <p:cNvSpPr>
+            <a:spLocks noGrp="1"/>
+          </p:cNvSpPr>
+          <p:nvPr>
+            <p:ph sz="quarter" idx="13"/>
+          </p:nvPr>
+        </p:nvSpPr>
+        <p:spPr>
+          <a:xfrm>
+            <a:off x="1088136" y="2651760"/>
+            <a:ext cx="7279116" cy="3694176"/>
+          </a:xfrm>
+        </p:spPr>
         <p:txBody>
           <a:bodyPr/>
           <a:lstStyle/>
           <a:p>
+            <a:pPr>
+              <a:buFont typeface="Wingdings" panose="05000000000000000000" pitchFamily="2" charset="2"/>
+              <a:buChar char="q"/>
+            </a:pPr>
             <a:r>
               <a:rPr lang="en-AU" dirty="0"/>
-              <a:t>Durable Agents</a:t>
+              <a:t>Sequential Task Execution in LLM-based workflows</a:t>
+            </a:r>
+          </a:p>
+          <a:p>
+            <a:pPr>
+              <a:buFont typeface="Wingdings" panose="05000000000000000000" pitchFamily="2" charset="2"/>
+              <a:buChar char="q"/>
+            </a:pPr>
+            <a:r>
+              <a:rPr lang="en-AU" dirty="0"/>
+              <a:t>Parallel Task Execution in LLM-based workflows</a:t>
+            </a:r>
+          </a:p>
+        </p:txBody>
+      </p:sp>
+      <p:sp>
+        <p:nvSpPr>
+          <p:cNvPr id="2" name="Title 1">
+            <a:extLst>
+              <a:ext uri="{FF2B5EF4-FFF2-40B4-BE49-F238E27FC236}">
+                <a16:creationId xmlns:a16="http://schemas.microsoft.com/office/drawing/2014/main" id="{A6BF459F-C301-21A4-462D-73E310C1E42C}"/>
+              </a:ext>
+            </a:extLst>
+          </p:cNvPr>
+          <p:cNvSpPr>
+            <a:spLocks noGrp="1"/>
+          </p:cNvSpPr>
+          <p:nvPr>
+            <p:ph type="title"/>
+          </p:nvPr>
+        </p:nvSpPr>
+        <p:spPr/>
+        <p:txBody>
+          <a:bodyPr/>
+          <a:lstStyle/>
+          <a:p>
+            <a:r>
+              <a:rPr lang="en-AU" dirty="0"/>
+              <a:t>Let’s dive into the code</a:t>
             </a:r>
           </a:p>
         </p:txBody>
@@ -30855,7 +33334,7 @@
           <p:cNvPr id="5" name="Picture 2" descr="Home - Dapr Agents">
             <a:extLst>
               <a:ext uri="{FF2B5EF4-FFF2-40B4-BE49-F238E27FC236}">
-                <a16:creationId xmlns:a16="http://schemas.microsoft.com/office/drawing/2014/main" id="{96BD182F-4C16-9259-9D18-3DA085D78341}"/>
+                <a16:creationId xmlns:a16="http://schemas.microsoft.com/office/drawing/2014/main" id="{A912D7B1-08E7-CA69-3F56-47175F8F410E}"/>
               </a:ext>
             </a:extLst>
           </p:cNvPr>
@@ -30865,436 +33344,7 @@
           <p:nvPr/>
         </p:nvPicPr>
         <p:blipFill>
-          <a:blip r:embed="rId2">
-            <a:extLst>
-              <a:ext uri="{28A0092B-C50C-407E-A947-70E740481C1C}">
-                <a14:useLocalDpi xmlns:a14="http://schemas.microsoft.com/office/drawing/2010/main" val="0"/>
-              </a:ext>
-            </a:extLst>
-          </a:blip>
-          <a:srcRect/>
-          <a:stretch>
-            <a:fillRect/>
-          </a:stretch>
-        </p:blipFill>
-        <p:spPr bwMode="auto">
-          <a:xfrm>
-            <a:off x="8834684" y="145348"/>
-            <a:ext cx="3476625" cy="3476625"/>
-          </a:xfrm>
-          <a:prstGeom prst="rect">
-            <a:avLst/>
-          </a:prstGeom>
-          <a:noFill/>
-          <a:extLst>
-            <a:ext uri="{909E8E84-426E-40DD-AFC4-6F175D3DCCD1}">
-              <a14:hiddenFill xmlns:a14="http://schemas.microsoft.com/office/drawing/2010/main">
-                <a:solidFill>
-                  <a:srgbClr val="FFFFFF"/>
-                </a:solidFill>
-              </a14:hiddenFill>
-            </a:ext>
-          </a:extLst>
-        </p:spPr>
-      </p:pic>
-      <p:pic>
-        <p:nvPicPr>
-          <p:cNvPr id="48" name="Picture 47">
-            <a:extLst>
-              <a:ext uri="{FF2B5EF4-FFF2-40B4-BE49-F238E27FC236}">
-                <a16:creationId xmlns:a16="http://schemas.microsoft.com/office/drawing/2014/main" id="{D3C9277F-3458-5F0C-D598-9EDE48B4AD28}"/>
-              </a:ext>
-            </a:extLst>
-          </p:cNvPr>
-          <p:cNvPicPr>
-            <a:picLocks noChangeAspect="1"/>
-          </p:cNvPicPr>
-          <p:nvPr/>
-        </p:nvPicPr>
-        <p:blipFill>
-          <a:blip r:embed="rId3"/>
-          <a:stretch>
-            <a:fillRect/>
-          </a:stretch>
-        </p:blipFill>
-        <p:spPr>
-          <a:xfrm>
-            <a:off x="1913918" y="1865376"/>
-            <a:ext cx="6094984" cy="4640151"/>
-          </a:xfrm>
-          <a:prstGeom prst="rect">
-            <a:avLst/>
-          </a:prstGeom>
-        </p:spPr>
-      </p:pic>
-    </p:spTree>
-    <p:extLst>
-      <p:ext uri="{BB962C8B-B14F-4D97-AF65-F5344CB8AC3E}">
-        <p14:creationId xmlns:p14="http://schemas.microsoft.com/office/powerpoint/2010/main" val="4021364256"/>
-      </p:ext>
-    </p:extLst>
-  </p:cSld>
-  <p:clrMapOvr>
-    <a:masterClrMapping/>
-  </p:clrMapOvr>
-</p:sld>
-</file>
-
-<file path=ppt/slides/slide6.xml><?xml version="1.0" encoding="utf-8"?>
-<p:sld xmlns:a="http://schemas.openxmlformats.org/drawingml/2006/main" xmlns:r="http://schemas.openxmlformats.org/officeDocument/2006/relationships" xmlns:p="http://schemas.openxmlformats.org/presentationml/2006/main">
-  <p:cSld>
-    <p:spTree>
-      <p:nvGrpSpPr>
-        <p:cNvPr id="1" name="">
-          <a:extLst>
-            <a:ext uri="{FF2B5EF4-FFF2-40B4-BE49-F238E27FC236}">
-              <a16:creationId xmlns:a16="http://schemas.microsoft.com/office/drawing/2014/main" id="{F01697C7-870F-D6FD-3ED2-F6BD69D8E80C}"/>
-            </a:ext>
-          </a:extLst>
-        </p:cNvPr>
-        <p:cNvGrpSpPr/>
-        <p:nvPr/>
-      </p:nvGrpSpPr>
-      <p:grpSpPr>
-        <a:xfrm>
-          <a:off x="0" y="0"/>
-          <a:ext cx="0" cy="0"/>
-          <a:chOff x="0" y="0"/>
-          <a:chExt cx="0" cy="0"/>
-        </a:xfrm>
-      </p:grpSpPr>
-      <p:sp>
-        <p:nvSpPr>
-          <p:cNvPr id="4" name="Rectangle 3">
-            <a:extLst>
-              <a:ext uri="{FF2B5EF4-FFF2-40B4-BE49-F238E27FC236}">
-                <a16:creationId xmlns:a16="http://schemas.microsoft.com/office/drawing/2014/main" id="{54637FE5-7866-383A-6AAA-C823AD8E7777}"/>
-              </a:ext>
-            </a:extLst>
-          </p:cNvPr>
-          <p:cNvSpPr/>
-          <p:nvPr/>
-        </p:nvSpPr>
-        <p:spPr>
-          <a:xfrm>
-            <a:off x="8953995" y="3764478"/>
-            <a:ext cx="3238005" cy="3093522"/>
-          </a:xfrm>
-          <a:prstGeom prst="rect">
-            <a:avLst/>
-          </a:prstGeom>
-        </p:spPr>
-        <p:style>
-          <a:lnRef idx="2">
-            <a:schemeClr val="accent1">
-              <a:shade val="15000"/>
-            </a:schemeClr>
-          </a:lnRef>
-          <a:fillRef idx="1">
-            <a:schemeClr val="accent1"/>
-          </a:fillRef>
-          <a:effectRef idx="0">
-            <a:schemeClr val="accent1"/>
-          </a:effectRef>
-          <a:fontRef idx="minor">
-            <a:schemeClr val="lt1"/>
-          </a:fontRef>
-        </p:style>
-        <p:txBody>
-          <a:bodyPr rtlCol="0" anchor="ctr"/>
-          <a:lstStyle/>
-          <a:p>
-            <a:pPr algn="ctr"/>
-            <a:endParaRPr lang="en-AU"/>
-          </a:p>
-        </p:txBody>
-      </p:sp>
-      <p:graphicFrame>
-        <p:nvGraphicFramePr>
-          <p:cNvPr id="6" name="Content Placeholder 5">
-            <a:extLst>
-              <a:ext uri="{FF2B5EF4-FFF2-40B4-BE49-F238E27FC236}">
-                <a16:creationId xmlns:a16="http://schemas.microsoft.com/office/drawing/2014/main" id="{1D7CB91C-2FCD-D914-D526-FDA50F7DDDE3}"/>
-              </a:ext>
-            </a:extLst>
-          </p:cNvPr>
-          <p:cNvGraphicFramePr>
-            <a:graphicFrameLocks noGrp="1"/>
-          </p:cNvGraphicFramePr>
-          <p:nvPr>
-            <p:ph sz="quarter" idx="13"/>
-            <p:extLst>
-              <p:ext uri="{D42A27DB-BD31-4B8C-83A1-F6EECF244321}">
-                <p14:modId xmlns:p14="http://schemas.microsoft.com/office/powerpoint/2010/main" val="2620610085"/>
-              </p:ext>
-            </p:extLst>
-          </p:nvPr>
-        </p:nvGraphicFramePr>
-        <p:xfrm>
-          <a:off x="1087439" y="2651125"/>
-          <a:ext cx="7747246" cy="3700514"/>
-        </p:xfrm>
-        <a:graphic>
-          <a:graphicData uri="http://schemas.openxmlformats.org/drawingml/2006/diagram">
-            <dgm:relIds xmlns:dgm="http://schemas.openxmlformats.org/drawingml/2006/diagram" xmlns:r="http://schemas.openxmlformats.org/officeDocument/2006/relationships" r:dm="rId2" r:lo="rId3" r:qs="rId4" r:cs="rId5"/>
-          </a:graphicData>
-        </a:graphic>
-      </p:graphicFrame>
-      <p:sp>
-        <p:nvSpPr>
-          <p:cNvPr id="2" name="Title 1">
-            <a:extLst>
-              <a:ext uri="{FF2B5EF4-FFF2-40B4-BE49-F238E27FC236}">
-                <a16:creationId xmlns:a16="http://schemas.microsoft.com/office/drawing/2014/main" id="{F774F3CB-3298-71BD-557C-E68FDB3501B3}"/>
-              </a:ext>
-            </a:extLst>
-          </p:cNvPr>
-          <p:cNvSpPr>
-            <a:spLocks noGrp="1"/>
-          </p:cNvSpPr>
-          <p:nvPr>
-            <p:ph type="title"/>
-          </p:nvPr>
-        </p:nvSpPr>
-        <p:spPr/>
-        <p:txBody>
-          <a:bodyPr/>
-          <a:lstStyle/>
-          <a:p>
-            <a:r>
-              <a:rPr lang="en-AU" dirty="0"/>
-              <a:t>Agent Collaboration in </a:t>
-            </a:r>
-            <a:br>
-              <a:rPr lang="en-AU" dirty="0"/>
-            </a:br>
-            <a:r>
-              <a:rPr lang="en-AU" dirty="0"/>
-              <a:t>Workflows</a:t>
-            </a:r>
-          </a:p>
-        </p:txBody>
-      </p:sp>
-      <p:pic>
-        <p:nvPicPr>
-          <p:cNvPr id="5" name="Picture 2" descr="Home - Dapr Agents">
-            <a:extLst>
-              <a:ext uri="{FF2B5EF4-FFF2-40B4-BE49-F238E27FC236}">
-                <a16:creationId xmlns:a16="http://schemas.microsoft.com/office/drawing/2014/main" id="{516C96A2-DBC1-5F9E-4004-D3DEB85E390A}"/>
-              </a:ext>
-            </a:extLst>
-          </p:cNvPr>
-          <p:cNvPicPr>
-            <a:picLocks noChangeAspect="1" noChangeArrowheads="1"/>
-          </p:cNvPicPr>
-          <p:nvPr/>
-        </p:nvPicPr>
-        <p:blipFill>
-          <a:blip r:embed="rId7">
-            <a:extLst>
-              <a:ext uri="{28A0092B-C50C-407E-A947-70E740481C1C}">
-                <a14:useLocalDpi xmlns:a14="http://schemas.microsoft.com/office/drawing/2010/main" val="0"/>
-              </a:ext>
-            </a:extLst>
-          </a:blip>
-          <a:srcRect/>
-          <a:stretch>
-            <a:fillRect/>
-          </a:stretch>
-        </p:blipFill>
-        <p:spPr bwMode="auto">
-          <a:xfrm>
-            <a:off x="8834684" y="145348"/>
-            <a:ext cx="3476625" cy="3476625"/>
-          </a:xfrm>
-          <a:prstGeom prst="rect">
-            <a:avLst/>
-          </a:prstGeom>
-          <a:noFill/>
-          <a:extLst>
-            <a:ext uri="{909E8E84-426E-40DD-AFC4-6F175D3DCCD1}">
-              <a14:hiddenFill xmlns:a14="http://schemas.microsoft.com/office/drawing/2010/main">
-                <a:solidFill>
-                  <a:srgbClr val="FFFFFF"/>
-                </a:solidFill>
-              </a14:hiddenFill>
-            </a:ext>
-          </a:extLst>
-        </p:spPr>
-      </p:pic>
-    </p:spTree>
-    <p:extLst>
-      <p:ext uri="{BB962C8B-B14F-4D97-AF65-F5344CB8AC3E}">
-        <p14:creationId xmlns:p14="http://schemas.microsoft.com/office/powerpoint/2010/main" val="3227880863"/>
-      </p:ext>
-    </p:extLst>
-  </p:cSld>
-  <p:clrMapOvr>
-    <a:masterClrMapping/>
-  </p:clrMapOvr>
-</p:sld>
-</file>
-
-<file path=ppt/slides/slide7.xml><?xml version="1.0" encoding="utf-8"?>
-<p:sld xmlns:a="http://schemas.openxmlformats.org/drawingml/2006/main" xmlns:r="http://schemas.openxmlformats.org/officeDocument/2006/relationships" xmlns:p="http://schemas.openxmlformats.org/presentationml/2006/main">
-  <p:cSld>
-    <p:spTree>
-      <p:nvGrpSpPr>
-        <p:cNvPr id="1" name="">
-          <a:extLst>
-            <a:ext uri="{FF2B5EF4-FFF2-40B4-BE49-F238E27FC236}">
-              <a16:creationId xmlns:a16="http://schemas.microsoft.com/office/drawing/2014/main" id="{E272230B-A744-A346-ABF8-7FCCFE194F3D}"/>
-            </a:ext>
-          </a:extLst>
-        </p:cNvPr>
-        <p:cNvGrpSpPr/>
-        <p:nvPr/>
-      </p:nvGrpSpPr>
-      <p:grpSpPr>
-        <a:xfrm>
-          <a:off x="0" y="0"/>
-          <a:ext cx="0" cy="0"/>
-          <a:chOff x="0" y="0"/>
-          <a:chExt cx="0" cy="0"/>
-        </a:xfrm>
-      </p:grpSpPr>
-      <p:sp>
-        <p:nvSpPr>
-          <p:cNvPr id="4" name="Rectangle 3">
-            <a:extLst>
-              <a:ext uri="{FF2B5EF4-FFF2-40B4-BE49-F238E27FC236}">
-                <a16:creationId xmlns:a16="http://schemas.microsoft.com/office/drawing/2014/main" id="{59F687C1-B9FD-82F1-2450-7861349201A9}"/>
-              </a:ext>
-            </a:extLst>
-          </p:cNvPr>
-          <p:cNvSpPr/>
-          <p:nvPr/>
-        </p:nvSpPr>
-        <p:spPr>
-          <a:xfrm>
-            <a:off x="8953995" y="3764478"/>
-            <a:ext cx="3238005" cy="3093522"/>
-          </a:xfrm>
-          <a:prstGeom prst="rect">
-            <a:avLst/>
-          </a:prstGeom>
-        </p:spPr>
-        <p:style>
-          <a:lnRef idx="2">
-            <a:schemeClr val="accent1">
-              <a:shade val="15000"/>
-            </a:schemeClr>
-          </a:lnRef>
-          <a:fillRef idx="1">
-            <a:schemeClr val="accent1"/>
-          </a:fillRef>
-          <a:effectRef idx="0">
-            <a:schemeClr val="accent1"/>
-          </a:effectRef>
-          <a:fontRef idx="minor">
-            <a:schemeClr val="lt1"/>
-          </a:fontRef>
-        </p:style>
-        <p:txBody>
-          <a:bodyPr rtlCol="0" anchor="ctr"/>
-          <a:lstStyle/>
-          <a:p>
-            <a:pPr algn="ctr"/>
-            <a:endParaRPr lang="en-AU"/>
-          </a:p>
-        </p:txBody>
-      </p:sp>
-      <p:sp>
-        <p:nvSpPr>
-          <p:cNvPr id="3" name="Content Placeholder 2">
-            <a:extLst>
-              <a:ext uri="{FF2B5EF4-FFF2-40B4-BE49-F238E27FC236}">
-                <a16:creationId xmlns:a16="http://schemas.microsoft.com/office/drawing/2014/main" id="{9877D093-0D59-E79B-9751-EFFD966277E8}"/>
-              </a:ext>
-            </a:extLst>
-          </p:cNvPr>
-          <p:cNvSpPr>
-            <a:spLocks noGrp="1"/>
-          </p:cNvSpPr>
-          <p:nvPr>
-            <p:ph sz="quarter" idx="13"/>
-          </p:nvPr>
-        </p:nvSpPr>
-        <p:spPr>
-          <a:xfrm>
-            <a:off x="1088136" y="2651760"/>
-            <a:ext cx="7279116" cy="3694176"/>
-          </a:xfrm>
-        </p:spPr>
-        <p:txBody>
-          <a:bodyPr/>
-          <a:lstStyle/>
-          <a:p>
-            <a:pPr>
-              <a:buFont typeface="Wingdings" panose="05000000000000000000" pitchFamily="2" charset="2"/>
-              <a:buChar char="q"/>
-            </a:pPr>
-            <a:r>
-              <a:rPr lang="en-AU" dirty="0"/>
-              <a:t>Sequential Task Execution in LLM-based workflows</a:t>
-            </a:r>
-          </a:p>
-          <a:p>
-            <a:pPr>
-              <a:buFont typeface="Wingdings" panose="05000000000000000000" pitchFamily="2" charset="2"/>
-              <a:buChar char="q"/>
-            </a:pPr>
-            <a:r>
-              <a:rPr lang="en-AU" dirty="0"/>
-              <a:t>Parallel Task Execution in LLM-based workflows</a:t>
-            </a:r>
-          </a:p>
-        </p:txBody>
-      </p:sp>
-      <p:sp>
-        <p:nvSpPr>
-          <p:cNvPr id="2" name="Title 1">
-            <a:extLst>
-              <a:ext uri="{FF2B5EF4-FFF2-40B4-BE49-F238E27FC236}">
-                <a16:creationId xmlns:a16="http://schemas.microsoft.com/office/drawing/2014/main" id="{A6BF459F-C301-21A4-462D-73E310C1E42C}"/>
-              </a:ext>
-            </a:extLst>
-          </p:cNvPr>
-          <p:cNvSpPr>
-            <a:spLocks noGrp="1"/>
-          </p:cNvSpPr>
-          <p:nvPr>
-            <p:ph type="title"/>
-          </p:nvPr>
-        </p:nvSpPr>
-        <p:spPr/>
-        <p:txBody>
-          <a:bodyPr/>
-          <a:lstStyle/>
-          <a:p>
-            <a:r>
-              <a:rPr lang="en-AU" dirty="0"/>
-              <a:t>Let’s dive into the code</a:t>
-            </a:r>
-          </a:p>
-        </p:txBody>
-      </p:sp>
-      <p:pic>
-        <p:nvPicPr>
-          <p:cNvPr id="5" name="Picture 2" descr="Home - Dapr Agents">
-            <a:extLst>
-              <a:ext uri="{FF2B5EF4-FFF2-40B4-BE49-F238E27FC236}">
-                <a16:creationId xmlns:a16="http://schemas.microsoft.com/office/drawing/2014/main" id="{A912D7B1-08E7-CA69-3F56-47175F8F410E}"/>
-              </a:ext>
-            </a:extLst>
-          </p:cNvPr>
-          <p:cNvPicPr>
-            <a:picLocks noChangeAspect="1" noChangeArrowheads="1"/>
-          </p:cNvPicPr>
-          <p:nvPr/>
-        </p:nvPicPr>
-        <p:blipFill>
-          <a:blip r:embed="rId2">
+          <a:blip r:embed="rId3">
             <a:extLst>
               <a:ext uri="{28A0092B-C50C-407E-A947-70E740481C1C}">
                 <a14:useLocalDpi xmlns:a14="http://schemas.microsoft.com/office/drawing/2010/main" val="0"/>
@@ -31336,6 +33386,18 @@
   <p:clrMapOvr>
     <a:masterClrMapping/>
   </p:clrMapOvr>
+  <mc:AlternateContent xmlns:mc="http://schemas.openxmlformats.org/markup-compatibility/2006">
+    <mc:Choice xmlns:p14="http://schemas.microsoft.com/office/powerpoint/2010/main" Requires="p14">
+      <p:transition spd="med" p14:dur="700">
+        <p:fade/>
+      </p:transition>
+    </mc:Choice>
+    <mc:Fallback>
+      <p:transition spd="med">
+        <p:fade/>
+      </p:transition>
+    </mc:Fallback>
+  </mc:AlternateContent>
 </p:sld>
 </file>
 
@@ -31538,4 +33600,319 @@
     </a:ext>
   </a:extLst>
 </a:theme>
+</file>
+
+<file path=ppt/theme/theme2.xml><?xml version="1.0" encoding="utf-8"?>
+<a:theme xmlns:a="http://schemas.openxmlformats.org/drawingml/2006/main" name="Office Theme">
+  <a:themeElements>
+    <a:clrScheme name="Office">
+      <a:dk1>
+        <a:sysClr val="windowText" lastClr="000000"/>
+      </a:dk1>
+      <a:lt1>
+        <a:sysClr val="window" lastClr="FFFFFF"/>
+      </a:lt1>
+      <a:dk2>
+        <a:srgbClr val="0E2841"/>
+      </a:dk2>
+      <a:lt2>
+        <a:srgbClr val="E8E8E8"/>
+      </a:lt2>
+      <a:accent1>
+        <a:srgbClr val="156082"/>
+      </a:accent1>
+      <a:accent2>
+        <a:srgbClr val="E97132"/>
+      </a:accent2>
+      <a:accent3>
+        <a:srgbClr val="196B24"/>
+      </a:accent3>
+      <a:accent4>
+        <a:srgbClr val="0F9ED5"/>
+      </a:accent4>
+      <a:accent5>
+        <a:srgbClr val="A02B93"/>
+      </a:accent5>
+      <a:accent6>
+        <a:srgbClr val="4EA72E"/>
+      </a:accent6>
+      <a:hlink>
+        <a:srgbClr val="467886"/>
+      </a:hlink>
+      <a:folHlink>
+        <a:srgbClr val="96607D"/>
+      </a:folHlink>
+    </a:clrScheme>
+    <a:fontScheme name="Office">
+      <a:majorFont>
+        <a:latin typeface="Aptos Display" panose="02110004020202020204"/>
+        <a:ea typeface=""/>
+        <a:cs typeface=""/>
+        <a:font script="Jpan" typeface="游ゴシック Light"/>
+        <a:font script="Hang" typeface="맑은 고딕"/>
+        <a:font script="Hans" typeface="等线 Light"/>
+        <a:font script="Hant" typeface="新細明體"/>
+        <a:font script="Arab" typeface="Times New Roman"/>
+        <a:font script="Hebr" typeface="Times New Roman"/>
+        <a:font script="Thai" typeface="Angsana New"/>
+        <a:font script="Ethi" typeface="Nyala"/>
+        <a:font script="Beng" typeface="Vrinda"/>
+        <a:font script="Gujr" typeface="Shruti"/>
+        <a:font script="Khmr" typeface="MoolBoran"/>
+        <a:font script="Knda" typeface="Tunga"/>
+        <a:font script="Guru" typeface="Raavi"/>
+        <a:font script="Cans" typeface="Euphemia"/>
+        <a:font script="Cher" typeface="Plantagenet Cherokee"/>
+        <a:font script="Yiii" typeface="Microsoft Yi Baiti"/>
+        <a:font script="Tibt" typeface="Microsoft Himalaya"/>
+        <a:font script="Thaa" typeface="MV Boli"/>
+        <a:font script="Deva" typeface="Mangal"/>
+        <a:font script="Telu" typeface="Gautami"/>
+        <a:font script="Taml" typeface="Latha"/>
+        <a:font script="Syrc" typeface="Estrangelo Edessa"/>
+        <a:font script="Orya" typeface="Kalinga"/>
+        <a:font script="Mlym" typeface="Kartika"/>
+        <a:font script="Laoo" typeface="DokChampa"/>
+        <a:font script="Sinh" typeface="Iskoola Pota"/>
+        <a:font script="Mong" typeface="Mongolian Baiti"/>
+        <a:font script="Viet" typeface="Times New Roman"/>
+        <a:font script="Uigh" typeface="Microsoft Uighur"/>
+        <a:font script="Geor" typeface="Sylfaen"/>
+        <a:font script="Armn" typeface="Arial"/>
+        <a:font script="Bugi" typeface="Leelawadee UI"/>
+        <a:font script="Bopo" typeface="Microsoft JhengHei"/>
+        <a:font script="Java" typeface="Javanese Text"/>
+        <a:font script="Lisu" typeface="Segoe UI"/>
+        <a:font script="Mymr" typeface="Myanmar Text"/>
+        <a:font script="Nkoo" typeface="Ebrima"/>
+        <a:font script="Olck" typeface="Nirmala UI"/>
+        <a:font script="Osma" typeface="Ebrima"/>
+        <a:font script="Phag" typeface="Phagspa"/>
+        <a:font script="Syrn" typeface="Estrangelo Edessa"/>
+        <a:font script="Syrj" typeface="Estrangelo Edessa"/>
+        <a:font script="Syre" typeface="Estrangelo Edessa"/>
+        <a:font script="Sora" typeface="Nirmala UI"/>
+        <a:font script="Tale" typeface="Microsoft Tai Le"/>
+        <a:font script="Talu" typeface="Microsoft New Tai Lue"/>
+        <a:font script="Tfng" typeface="Ebrima"/>
+      </a:majorFont>
+      <a:minorFont>
+        <a:latin typeface="Aptos" panose="02110004020202020204"/>
+        <a:ea typeface=""/>
+        <a:cs typeface=""/>
+        <a:font script="Jpan" typeface="游ゴシック"/>
+        <a:font script="Hang" typeface="맑은 고딕"/>
+        <a:font script="Hans" typeface="等线"/>
+        <a:font script="Hant" typeface="新細明體"/>
+        <a:font script="Arab" typeface="Arial"/>
+        <a:font script="Hebr" typeface="Arial"/>
+        <a:font script="Thai" typeface="Cordia New"/>
+        <a:font script="Ethi" typeface="Nyala"/>
+        <a:font script="Beng" typeface="Vrinda"/>
+        <a:font script="Gujr" typeface="Shruti"/>
+        <a:font script="Khmr" typeface="DaunPenh"/>
+        <a:font script="Knda" typeface="Tunga"/>
+        <a:font script="Guru" typeface="Raavi"/>
+        <a:font script="Cans" typeface="Euphemia"/>
+        <a:font script="Cher" typeface="Plantagenet Cherokee"/>
+        <a:font script="Yiii" typeface="Microsoft Yi Baiti"/>
+        <a:font script="Tibt" typeface="Microsoft Himalaya"/>
+        <a:font script="Thaa" typeface="MV Boli"/>
+        <a:font script="Deva" typeface="Mangal"/>
+        <a:font script="Telu" typeface="Gautami"/>
+        <a:font script="Taml" typeface="Latha"/>
+        <a:font script="Syrc" typeface="Estrangelo Edessa"/>
+        <a:font script="Orya" typeface="Kalinga"/>
+        <a:font script="Mlym" typeface="Kartika"/>
+        <a:font script="Laoo" typeface="DokChampa"/>
+        <a:font script="Sinh" typeface="Iskoola Pota"/>
+        <a:font script="Mong" typeface="Mongolian Baiti"/>
+        <a:font script="Viet" typeface="Arial"/>
+        <a:font script="Uigh" typeface="Microsoft Uighur"/>
+        <a:font script="Geor" typeface="Sylfaen"/>
+        <a:font script="Armn" typeface="Arial"/>
+        <a:font script="Bugi" typeface="Leelawadee UI"/>
+        <a:font script="Bopo" typeface="Microsoft JhengHei"/>
+        <a:font script="Java" typeface="Javanese Text"/>
+        <a:font script="Lisu" typeface="Segoe UI"/>
+        <a:font script="Mymr" typeface="Myanmar Text"/>
+        <a:font script="Nkoo" typeface="Ebrima"/>
+        <a:font script="Olck" typeface="Nirmala UI"/>
+        <a:font script="Osma" typeface="Ebrima"/>
+        <a:font script="Phag" typeface="Phagspa"/>
+        <a:font script="Syrn" typeface="Estrangelo Edessa"/>
+        <a:font script="Syrj" typeface="Estrangelo Edessa"/>
+        <a:font script="Syre" typeface="Estrangelo Edessa"/>
+        <a:font script="Sora" typeface="Nirmala UI"/>
+        <a:font script="Tale" typeface="Microsoft Tai Le"/>
+        <a:font script="Talu" typeface="Microsoft New Tai Lue"/>
+        <a:font script="Tfng" typeface="Ebrima"/>
+      </a:minorFont>
+    </a:fontScheme>
+    <a:fmtScheme name="Office">
+      <a:fillStyleLst>
+        <a:solidFill>
+          <a:schemeClr val="phClr"/>
+        </a:solidFill>
+        <a:gradFill rotWithShape="1">
+          <a:gsLst>
+            <a:gs pos="0">
+              <a:schemeClr val="phClr">
+                <a:lumMod val="110000"/>
+                <a:satMod val="105000"/>
+                <a:tint val="67000"/>
+              </a:schemeClr>
+            </a:gs>
+            <a:gs pos="50000">
+              <a:schemeClr val="phClr">
+                <a:lumMod val="105000"/>
+                <a:satMod val="103000"/>
+                <a:tint val="73000"/>
+              </a:schemeClr>
+            </a:gs>
+            <a:gs pos="100000">
+              <a:schemeClr val="phClr">
+                <a:lumMod val="105000"/>
+                <a:satMod val="109000"/>
+                <a:tint val="81000"/>
+              </a:schemeClr>
+            </a:gs>
+          </a:gsLst>
+          <a:lin ang="5400000" scaled="0"/>
+        </a:gradFill>
+        <a:gradFill rotWithShape="1">
+          <a:gsLst>
+            <a:gs pos="0">
+              <a:schemeClr val="phClr">
+                <a:satMod val="103000"/>
+                <a:lumMod val="102000"/>
+                <a:tint val="94000"/>
+              </a:schemeClr>
+            </a:gs>
+            <a:gs pos="50000">
+              <a:schemeClr val="phClr">
+                <a:satMod val="110000"/>
+                <a:lumMod val="100000"/>
+                <a:shade val="100000"/>
+              </a:schemeClr>
+            </a:gs>
+            <a:gs pos="100000">
+              <a:schemeClr val="phClr">
+                <a:lumMod val="99000"/>
+                <a:satMod val="120000"/>
+                <a:shade val="78000"/>
+              </a:schemeClr>
+            </a:gs>
+          </a:gsLst>
+          <a:lin ang="5400000" scaled="0"/>
+        </a:gradFill>
+      </a:fillStyleLst>
+      <a:lnStyleLst>
+        <a:ln w="12700" cap="flat" cmpd="sng" algn="ctr">
+          <a:solidFill>
+            <a:schemeClr val="phClr"/>
+          </a:solidFill>
+          <a:prstDash val="solid"/>
+          <a:miter lim="800000"/>
+        </a:ln>
+        <a:ln w="19050" cap="flat" cmpd="sng" algn="ctr">
+          <a:solidFill>
+            <a:schemeClr val="phClr"/>
+          </a:solidFill>
+          <a:prstDash val="solid"/>
+          <a:miter lim="800000"/>
+        </a:ln>
+        <a:ln w="25400" cap="flat" cmpd="sng" algn="ctr">
+          <a:solidFill>
+            <a:schemeClr val="phClr"/>
+          </a:solidFill>
+          <a:prstDash val="solid"/>
+          <a:miter lim="800000"/>
+        </a:ln>
+      </a:lnStyleLst>
+      <a:effectStyleLst>
+        <a:effectStyle>
+          <a:effectLst/>
+        </a:effectStyle>
+        <a:effectStyle>
+          <a:effectLst/>
+        </a:effectStyle>
+        <a:effectStyle>
+          <a:effectLst>
+            <a:outerShdw blurRad="57150" dist="19050" dir="5400000" algn="ctr" rotWithShape="0">
+              <a:srgbClr val="000000">
+                <a:alpha val="63000"/>
+              </a:srgbClr>
+            </a:outerShdw>
+          </a:effectLst>
+        </a:effectStyle>
+      </a:effectStyleLst>
+      <a:bgFillStyleLst>
+        <a:solidFill>
+          <a:schemeClr val="phClr"/>
+        </a:solidFill>
+        <a:solidFill>
+          <a:schemeClr val="phClr">
+            <a:tint val="95000"/>
+            <a:satMod val="170000"/>
+          </a:schemeClr>
+        </a:solidFill>
+        <a:gradFill rotWithShape="1">
+          <a:gsLst>
+            <a:gs pos="0">
+              <a:schemeClr val="phClr">
+                <a:tint val="93000"/>
+                <a:satMod val="150000"/>
+                <a:shade val="98000"/>
+                <a:lumMod val="102000"/>
+              </a:schemeClr>
+            </a:gs>
+            <a:gs pos="50000">
+              <a:schemeClr val="phClr">
+                <a:tint val="98000"/>
+                <a:satMod val="130000"/>
+                <a:shade val="90000"/>
+                <a:lumMod val="103000"/>
+              </a:schemeClr>
+            </a:gs>
+            <a:gs pos="100000">
+              <a:schemeClr val="phClr">
+                <a:shade val="63000"/>
+                <a:satMod val="120000"/>
+              </a:schemeClr>
+            </a:gs>
+          </a:gsLst>
+          <a:lin ang="5400000" scaled="0"/>
+        </a:gradFill>
+      </a:bgFillStyleLst>
+    </a:fmtScheme>
+  </a:themeElements>
+  <a:objectDefaults>
+    <a:lnDef>
+      <a:spPr/>
+      <a:bodyPr/>
+      <a:lstStyle/>
+      <a:style>
+        <a:lnRef idx="2">
+          <a:schemeClr val="accent1"/>
+        </a:lnRef>
+        <a:fillRef idx="0">
+          <a:schemeClr val="accent1"/>
+        </a:fillRef>
+        <a:effectRef idx="1">
+          <a:schemeClr val="accent1"/>
+        </a:effectRef>
+        <a:fontRef idx="minor">
+          <a:schemeClr val="tx1"/>
+        </a:fontRef>
+      </a:style>
+    </a:lnDef>
+  </a:objectDefaults>
+  <a:extraClrSchemeLst/>
+  <a:extLst>
+    <a:ext uri="{05A4C25C-085E-4340-85A3-A5531E510DB2}">
+      <thm15:themeFamily xmlns:thm15="http://schemas.microsoft.com/office/thememl/2012/main" name="Office Theme" id="{2E142A2C-CD16-42D6-873A-C26D2A0506FA}" vid="{1BDDFF52-6CD6-40A5-AB3C-68EB2F1E4D0A}"/>
+    </a:ext>
+  </a:extLst>
+</a:theme>
 </file>
</xml_diff>